<commit_message>
updated product_design_overview project_requirements feasibility_analysis and GUI_Design_SM_0.1
</commit_message>
<xml_diff>
--- a/deliverables/product_design_overview.pptx
+++ b/deliverables/product_design_overview.pptx
@@ -5,21 +5,19 @@
     <p:sldMasterId id="2147483648" r:id="rId1"/>
   </p:sldMasterIdLst>
   <p:notesMasterIdLst>
-    <p:notesMasterId r:id="rId14"/>
+    <p:notesMasterId r:id="rId12"/>
   </p:notesMasterIdLst>
   <p:sldIdLst>
-    <p:sldId id="275" r:id="rId2"/>
+    <p:sldId id="256" r:id="rId2"/>
     <p:sldId id="271" r:id="rId3"/>
     <p:sldId id="267" r:id="rId4"/>
     <p:sldId id="269" r:id="rId5"/>
-    <p:sldId id="274" r:id="rId6"/>
-    <p:sldId id="257" r:id="rId7"/>
-    <p:sldId id="258" r:id="rId8"/>
-    <p:sldId id="261" r:id="rId9"/>
-    <p:sldId id="262" r:id="rId10"/>
-    <p:sldId id="264" r:id="rId11"/>
-    <p:sldId id="273" r:id="rId12"/>
-    <p:sldId id="265" r:id="rId13"/>
+    <p:sldId id="276" r:id="rId6"/>
+    <p:sldId id="277" r:id="rId7"/>
+    <p:sldId id="274" r:id="rId8"/>
+    <p:sldId id="257" r:id="rId9"/>
+    <p:sldId id="273" r:id="rId10"/>
+    <p:sldId id="278" r:id="rId11"/>
   </p:sldIdLst>
   <p:sldSz cx="12192000" cy="6858000"/>
   <p:notesSz cx="6858000" cy="9144000"/>
@@ -122,6 +120,9 @@
     <p:ext uri="{EFAFB233-063F-42B5-8137-9DF3F51BA10A}">
       <p15:sldGuideLst xmlns:p15="http://schemas.microsoft.com/office/powerpoint/2012/main"/>
     </p:ext>
+    <p:ext uri="{2D200454-40CA-4A62-9FC3-DE9A4176ACB9}">
+      <p15:notesGuideLst xmlns:p15="http://schemas.microsoft.com/office/powerpoint/2012/main"/>
+    </p:ext>
   </p:extLst>
 </p:presentation>
 </file>
@@ -208,7 +209,7 @@
           <a:p>
             <a:fld id="{2DEEBC3D-94C5-BA41-9BE6-EFF90E15FC91}" type="datetimeFigureOut">
               <a:rPr lang="en-US" smtClean="0"/>
-              <a:t>5/3/23</a:t>
+              <a:t>5/27/23</a:t>
             </a:fld>
             <a:endParaRPr lang="en-US"/>
           </a:p>
@@ -519,7 +520,10 @@
           <a:bodyPr/>
           <a:lstStyle/>
           <a:p>
-            <a:endParaRPr lang="en-US" dirty="0"/>
+            <a:r>
+              <a:rPr lang="en-US" dirty="0"/>
+              <a:t>Hello, this is Justin Campbell again. Thank you for dropping in; I would assume that you watched the first video and that it peaked your interest. This video will be the second in a series of videos aimed to provide climate science enthusiasts with information on the utility of cloud computing within the scope of building and running climate models. In this deliverable, I will provide you first with a recap of the product design process and the project objectives. Feel free to skip these sections if you are not in need of a recap. From here, a discussion of design requirements in requirements gathering will be provided before moving onto the final and most important topic of this deliverable, namely, a presentation of high-level product designs for distributed systems that aim to satisfy the SMART and stretch goals discussed in the project objectives. </a:t>
+            </a:r>
           </a:p>
         </p:txBody>
       </p:sp>
@@ -612,25 +616,12 @@
             <a:endParaRPr lang="en-US" dirty="0"/>
           </a:p>
           <a:p>
+            <a:endParaRPr lang="en-US" dirty="0"/>
+          </a:p>
+          <a:p>
             <a:r>
               <a:rPr lang="en-US" dirty="0"/>
-              <a:t>The next steps in the project design process will involve finalizing and documenting product and design and product system design frameworks from their schematics and sketches, using these finalized design frameworks to develop working preliminary designs that are specific to particular software-applications/computing platforms, testing the behavior of the preliminary designs to validate their functionality against requirements and objectives, and use these tested designs to </a:t>
-            </a:r>
-            <a:r>
-              <a:rPr lang="en-US" dirty="0" err="1"/>
-              <a:t>downselect</a:t>
-            </a:r>
-            <a:r>
-              <a:rPr lang="en-US" dirty="0"/>
-              <a:t> a final design that is most desirable according to the results of one or more </a:t>
-            </a:r>
-            <a:r>
-              <a:rPr lang="en-US" dirty="0" err="1"/>
-              <a:t>Feasbility</a:t>
-            </a:r>
-            <a:r>
-              <a:rPr lang="en-US" dirty="0"/>
-              <a:t> Tools. </a:t>
+              <a:t>And here are the references. Any questions? </a:t>
             </a:r>
           </a:p>
         </p:txBody>
@@ -652,7 +643,7 @@
           <a:p>
             <a:fld id="{406A5E4B-0CAD-DE41-9697-DAE3CDD53949}" type="slidenum">
               <a:rPr lang="en-US" smtClean="0"/>
-              <a:t>11</a:t>
+              <a:t>10</a:t>
             </a:fld>
             <a:endParaRPr lang="en-US"/>
           </a:p>
@@ -661,7 +652,7 @@
     </p:spTree>
     <p:extLst>
       <p:ext uri="{BB962C8B-B14F-4D97-AF65-F5344CB8AC3E}">
-        <p14:creationId xmlns:p14="http://schemas.microsoft.com/office/powerpoint/2010/main" val="1801297930"/>
+        <p14:creationId xmlns:p14="http://schemas.microsoft.com/office/powerpoint/2010/main" val="4229253459"/>
       </p:ext>
     </p:extLst>
   </p:cSld>
@@ -729,7 +720,7 @@
           <a:p>
             <a:r>
               <a:rPr lang="en-US" dirty="0"/>
-              <a:t>So before running through the product and sub-system designs, I want to provide a refresher on the design process methodology that I am incorporating into this project. This methodology is broken down into the six phases shown in this schematic. Having begun incorporating feedback from project collaborators on requirements and design ideas into my product system designs, I am currently progressing through the ‘Understand’ and ‘Ideate’ phases to develop the framework of my product design before translating that software-application/architecture agnostic product design into working preliminary designs that will be tested in the next step itemized as the ‘Evaluate’ step.</a:t>
+              <a:t>So, I want to provide a refresher on the design process methodology that I have incorporated into this project. This methodology is broken down into the six phases shown in this schematic. Having begun incorporating feedback from project collaborators on requirements and design ideas into my product system designs, I am currently progressing through the ‘Understand’ and ‘Ideate’ phases to develop the framework of my product design before translating that software-application/architecture agnostic product design into working preliminary designs that will be tested in the next steps itemized in the ‘Evaluate’ phase.</a:t>
             </a:r>
           </a:p>
           <a:p>
@@ -1562,7 +1553,27 @@
           <a:bodyPr/>
           <a:lstStyle/>
           <a:p>
+            <a:r>
+              <a:rPr lang="en-US" dirty="0"/>
+              <a:t>After developing project objectives and determining general frameworks for a product development/design process, development environment workflows, and a communication hierarchy, I began documenting project requirements according to feedback received from fellow graduate students and personal knowledge of how to improve the </a:t>
+            </a:r>
+            <a:r>
+              <a:rPr lang="en-US" dirty="0" err="1"/>
+              <a:t>MITgcm</a:t>
+            </a:r>
+            <a:r>
+              <a:rPr lang="en-US" dirty="0"/>
+              <a:t>-ECCO workflow. In particular, the project requirements have and will continue to be documented into two parent categories, namely, subjective technical requirements, often referred to as qualitative requirements which are those that are interpretative and describe a product or projects requirements at a high-level, and quantitative requirements sometimes, merely referred to as technical requirements, which are those that are countable, measurable, and thus ascribed a numerical value for verification.</a:t>
+            </a:r>
+          </a:p>
+          <a:p>
             <a:endParaRPr lang="en-US" dirty="0"/>
+          </a:p>
+          <a:p>
+            <a:r>
+              <a:rPr lang="en-US" dirty="0"/>
+              <a:t>Now, requirements will be continuously updated as I see fit according to time and development environment constraints. </a:t>
+            </a:r>
           </a:p>
         </p:txBody>
       </p:sp>
@@ -1592,7 +1603,7 @@
     </p:spTree>
     <p:extLst>
       <p:ext uri="{BB962C8B-B14F-4D97-AF65-F5344CB8AC3E}">
-        <p14:creationId xmlns:p14="http://schemas.microsoft.com/office/powerpoint/2010/main" val="1347321373"/>
+        <p14:creationId xmlns:p14="http://schemas.microsoft.com/office/powerpoint/2010/main" val="3438425652"/>
       </p:ext>
     </p:extLst>
   </p:cSld>
@@ -1648,8 +1659,62 @@
           <a:p>
             <a:r>
               <a:rPr lang="en-US" dirty="0"/>
-              <a:t>Provide a list of systems in the product design and how they communicate with each other through a flowchart and/or bulleted list</a:t>
-            </a:r>
+              <a:t>Since the project’s objectives are to release a product that is robust enough to incorporate a majority if not all of the tasks in the </a:t>
+            </a:r>
+            <a:r>
+              <a:rPr lang="en-US" dirty="0" err="1"/>
+              <a:t>MITgcm</a:t>
+            </a:r>
+            <a:r>
+              <a:rPr lang="en-US" dirty="0"/>
+              <a:t>-ECCO workflow, it is reasonable to conceive a system design that divides the workflow tasks across multiple portable units of software (containers) to prevent one unit of software from taking on a computationally intensive quantity of tasks that exceed memory allocation, result in slow performance, or crashing to name a concerns. This necessitates the need for the containers to communicate the output of these tasks with one another in real time to effectively balance the workflow which can be accomplished using a container orchestration system. Since both the container technology platform and the container orchestration system will be run on user’s host machine’s there will be host machine software and hardware requirements that must be met for successful use of the products. </a:t>
+            </a:r>
+          </a:p>
+          <a:p>
+            <a:endParaRPr lang="en-US" dirty="0"/>
+          </a:p>
+          <a:p>
+            <a:endParaRPr lang="en-US" dirty="0"/>
+          </a:p>
+          <a:p>
+            <a:r>
+              <a:rPr lang="en-US" dirty="0"/>
+              <a:t>Thus, the requirements have been assigned to three systems that will be incorporated into the design of the products, namely, the container technology system, container orchestration system, and a software stack system. The Containerization technology system refers to the open-source containerization platform itself in which the containers will be built, tested, and deployed from (examples include docker, </a:t>
+            </a:r>
+            <a:r>
+              <a:rPr lang="en-US" dirty="0" err="1"/>
+              <a:t>coreOS</a:t>
+            </a:r>
+            <a:r>
+              <a:rPr lang="en-US" dirty="0"/>
+              <a:t> </a:t>
+            </a:r>
+            <a:r>
+              <a:rPr lang="en-US" dirty="0" err="1"/>
+              <a:t>rkt</a:t>
+            </a:r>
+            <a:r>
+              <a:rPr lang="en-US" dirty="0"/>
+              <a:t>, and cloud foundry). The Container Orchestration System designation is a system in which the containers, databases, and other services/microservices will be developed to communicate in a load-balanced distributed system. Lastly, the Containerization Software Stack is a software stack from which the containers, the source code running on the containers, microservices, and the communication between them will be built.</a:t>
+            </a:r>
+          </a:p>
+          <a:p>
+            <a:endParaRPr lang="en-US" dirty="0"/>
+          </a:p>
+          <a:p>
+            <a:endParaRPr lang="en-US" dirty="0"/>
+          </a:p>
+          <a:p>
+            <a:r>
+              <a:rPr lang="en-US" dirty="0"/>
+              <a:t>Then, to expand on what was mentioned previously, the requirements within each system scope will be categorized as either subjective technical requirements or quantitative requirements. </a:t>
+            </a:r>
+          </a:p>
+          <a:p>
+            <a:endParaRPr lang="en-US" dirty="0"/>
+          </a:p>
+          <a:p>
+            <a:endParaRPr lang="en-US" dirty="0"/>
           </a:p>
         </p:txBody>
       </p:sp>
@@ -1679,7 +1744,7 @@
     </p:spTree>
     <p:extLst>
       <p:ext uri="{BB962C8B-B14F-4D97-AF65-F5344CB8AC3E}">
-        <p14:creationId xmlns:p14="http://schemas.microsoft.com/office/powerpoint/2010/main" val="2416609202"/>
+        <p14:creationId xmlns:p14="http://schemas.microsoft.com/office/powerpoint/2010/main" val="323152765"/>
       </p:ext>
     </p:extLst>
   </p:cSld>
@@ -1735,7 +1800,48 @@
           <a:p>
             <a:r>
               <a:rPr lang="en-US" dirty="0"/>
-              <a:t>Provide high-level flowchart to characterize flow of information in system in a way that is software-application-independent. Consider adding a second slide to do the same for any sub-systems in the system design such as illustrating pseudocode or algorithmic structure using class diagrams. </a:t>
+              <a:t>Next, high-level product designs that are used to communicate the intended workflow of the products will be provided in rudimentary flowcharts. These flowcharts provide a sequential order of operations in which the containers, services and microservices in the product will execute to perform high-level tasks in the </a:t>
+            </a:r>
+            <a:r>
+              <a:rPr lang="en-US" dirty="0" err="1"/>
+              <a:t>MITgcm</a:t>
+            </a:r>
+            <a:r>
+              <a:rPr lang="en-US" dirty="0"/>
+              <a:t> or </a:t>
+            </a:r>
+            <a:r>
+              <a:rPr lang="en-US" dirty="0" err="1"/>
+              <a:t>MITgcm</a:t>
+            </a:r>
+            <a:r>
+              <a:rPr lang="en-US" dirty="0"/>
+              <a:t>-ECCO workflow. More high-level schematics and detailed designs will be provided for both individual systems and the services/microservices in those systems later in the project timeline once system designs have been </a:t>
+            </a:r>
+            <a:r>
+              <a:rPr lang="en-US" dirty="0" err="1"/>
+              <a:t>downselected</a:t>
+            </a:r>
+            <a:r>
+              <a:rPr lang="en-US" dirty="0"/>
+              <a:t> from the Feasibility Analysis and container technology and orchestration systems have been installed and configured in development environments. Now, shown in this slide is a high-level product design of a containerized distributed system whose behavior is to be consistent with the objectives documented under the aforementioned SMART Goals.</a:t>
+            </a:r>
+          </a:p>
+          <a:p>
+            <a:endParaRPr lang="en-US" dirty="0"/>
+          </a:p>
+          <a:p>
+            <a:r>
+              <a:rPr lang="en-US" dirty="0"/>
+              <a:t> From the standpoint of the end user, the first step would be to initialize the containerization engine and container orchestration system on the end users’ machine. From here, the end user would be expected to pull containers that are tagged for release from an Image Registry to their local machine. Then, the end user would be expected to run one more command from the user’s terminal, namely, one that executes a base container, let it be container #1, that prompts the user to input model compile and runtime parameters along with other model configurations such as processor number, temporal/spatial domain ranges, time step sizes etc. through a GUI excluding support for MPI at first due to complexities between libraries that need to be installed both inside and outside of the container on the user’s host machine. From here, the container would build a job scheduling/submission script to schedule the model compilation and execution on a job scheduling platform such as </a:t>
+            </a:r>
+            <a:r>
+              <a:rPr lang="en-US" dirty="0" err="1"/>
+              <a:t>Slurm</a:t>
+            </a:r>
+            <a:r>
+              <a:rPr lang="en-US" dirty="0"/>
+              <a:t>. Then, the container orchestration system would spin up a second container to load balance tasks running on instances of the container daemon. Before executing any tasks on the second container, the first container would then relay the job submission script to the second container using a network protocol and then terminate the first container to load balance tasks running on the container daemons. From here the job script would be submitted to initialize job scheduling and execution on the compute nodes being leveraged by the host machine’s HPC cluster. Then, when memory is available, the compute nodes will execute the job script to compile the model and run the executable. The container will then write the standard and error output out to a file for the end user to view. The end user may then run commands inside the container to write the data out to a custom volume for future reference. They will then be prompted through a GUI to run another model problem and if yes, the second container will be terminated, the first container run for a second time, and the remainder of the procedure will repeat. Otherwise, if the end user decides not to run another model problem, the container daemon will terminate the container and ultimately the entire distributed system culminating in the shut down of the containerization engine. </a:t>
             </a:r>
           </a:p>
         </p:txBody>
@@ -1766,7 +1872,7 @@
     </p:spTree>
     <p:extLst>
       <p:ext uri="{BB962C8B-B14F-4D97-AF65-F5344CB8AC3E}">
-        <p14:creationId xmlns:p14="http://schemas.microsoft.com/office/powerpoint/2010/main" val="749747696"/>
+        <p14:creationId xmlns:p14="http://schemas.microsoft.com/office/powerpoint/2010/main" val="1347321373"/>
       </p:ext>
     </p:extLst>
   </p:cSld>
@@ -1820,30 +1926,22 @@
           <a:bodyPr/>
           <a:lstStyle/>
           <a:p>
-            <a:pPr marL="0" marR="0" lvl="0" indent="0" algn="l" defTabSz="914400" rtl="0" eaLnBrk="1" fontAlgn="auto" latinLnBrk="0" hangingPunct="1">
-              <a:lnSpc>
-                <a:spcPct val="100000"/>
-              </a:lnSpc>
-              <a:spcBef>
-                <a:spcPts val="0"/>
-              </a:spcBef>
-              <a:spcAft>
-                <a:spcPts val="0"/>
-              </a:spcAft>
-              <a:buClrTx/>
-              <a:buSzTx/>
-              <a:buFontTx/>
-              <a:buNone/>
-              <a:tabLst/>
-              <a:defRPr/>
+            <a:pPr marL="171450" indent="-171450">
+              <a:buFont typeface="Arial" panose="020B0604020202020204" pitchFamily="34" charset="0"/>
+              <a:buChar char="•"/>
             </a:pPr>
             <a:r>
               <a:rPr lang="en-US" dirty="0"/>
-              <a:t>Provide high-level flowchart to characterize flow of information in system in a way that is software-application-independent. Consider adding a second slide to do the same for any sub-systems in the system design such as illustrating pseudocode or algorithmic structure using class diagrams. </a:t>
-            </a:r>
-          </a:p>
-          <a:p>
-            <a:endParaRPr lang="en-US" dirty="0"/>
+              <a:t>Now, this slide provides a similar flowchart whose elements are slightly amended and more introduced with an intention of satisfying the stretch goals in the project. The first difference between the two designs lies in support for building and running model problems using MPI libraries as shown in the third element in the left-most vertical column. Fast-forwarding a bit through the elements, after the compute nodes have executed the job to compile and run the executable, the model output will be relayed to a third container spun up in the container orchestration system before the system terminates the second container. This third container will use a GUI to prompt the user to select data-processing/data analytics methods to execute under the hood to process output data according to subroutines incorporated into ECCO python libraries. This will ideally allow for the system to automate the performance of any analyses technique on the output data that the end user would otherwise be required to learn and reproduce manually upon installing, and configuring an environment for using ECCO libraries on their host machines. The output of these data processing and analyses tasks would then be rendered on a GUI inside of the containerized environment if the end user desires, and they shall be given the option to write out the analyses to a volume on their machine. </a:t>
+            </a:r>
+            <a:r>
+              <a:rPr lang="en-US" dirty="0" err="1"/>
+              <a:t>Laslty</a:t>
+            </a:r>
+            <a:r>
+              <a:rPr lang="en-US" dirty="0"/>
+              <a:t>, similar to the design of the former product, the end user will be prompted with a message to run another model problem and if yes, the procedure would repeat, otherwise, the distributed system would be terminated. </a:t>
+            </a:r>
           </a:p>
         </p:txBody>
       </p:sp>
@@ -1873,7 +1971,7 @@
     </p:spTree>
     <p:extLst>
       <p:ext uri="{BB962C8B-B14F-4D97-AF65-F5344CB8AC3E}">
-        <p14:creationId xmlns:p14="http://schemas.microsoft.com/office/powerpoint/2010/main" val="846904125"/>
+        <p14:creationId xmlns:p14="http://schemas.microsoft.com/office/powerpoint/2010/main" val="2416609202"/>
       </p:ext>
     </p:extLst>
   </p:cSld>
@@ -1927,30 +2025,45 @@
           <a:bodyPr/>
           <a:lstStyle/>
           <a:p>
-            <a:pPr marL="0" marR="0" lvl="0" indent="0" algn="l" defTabSz="914400" rtl="0" eaLnBrk="1" fontAlgn="auto" latinLnBrk="0" hangingPunct="1">
-              <a:lnSpc>
-                <a:spcPct val="100000"/>
-              </a:lnSpc>
-              <a:spcBef>
-                <a:spcPts val="0"/>
-              </a:spcBef>
-              <a:spcAft>
-                <a:spcPts val="0"/>
-              </a:spcAft>
-              <a:buClrTx/>
-              <a:buSzTx/>
-              <a:buFontTx/>
-              <a:buNone/>
-              <a:tabLst/>
-              <a:defRPr/>
-            </a:pPr>
             <a:r>
               <a:rPr lang="en-US" dirty="0"/>
-              <a:t>Provide high-level flowchart to characterize flow of information in system in a way that is software-application-independent. Consider adding a second slide to do the same for any sub-systems in the system design such as illustrating pseudocode or algorithmic structure using class diagrams. </a:t>
+              <a:t>Speaker Notes: </a:t>
             </a:r>
           </a:p>
           <a:p>
             <a:endParaRPr lang="en-US" dirty="0"/>
+          </a:p>
+          <a:p>
+            <a:r>
+              <a:rPr lang="en-US" dirty="0"/>
+              <a:t>The next steps in the project timeline will involve continuing the documentation of product design requirements according to subjective technical requirements and quantitative requirements for each system in the product design, namely, container technology system, container orchestration system, and product software stack systems. Preliminary designs for each system will be researched and documented and for this particular project, the preliminary designs for the container technology and container orchestration systems will refer to open-source products that have already been developed but whose application to this project need be studied. With respect to the software stacks for the two product releases, preliminary designs may be incorporated into the project lifecycle after a suitable container orchestration and technology system have been chosen and incorporated into the developer’s workflow. This potential delay stems from the developer’s interest in determining and getting comfortable with the computational constraints of developing and testing source code using these systems. There may be limitations to translating certain high-level design preferences for the software stack into these development environments (such as environment not being compatible with graphical user interfaces, or memory/load balance restrictions when attempting to run intensive code that satisfies certain stretch objectives.</a:t>
+            </a:r>
+          </a:p>
+          <a:p>
+            <a:endParaRPr lang="en-US" dirty="0"/>
+          </a:p>
+          <a:p>
+            <a:r>
+              <a:rPr lang="en-US" dirty="0"/>
+              <a:t>Thirdly, once these preliminary designs have been set aside, strengths and weaknesses of these designs will be documented and the designs will be checked against requirements</a:t>
+            </a:r>
+          </a:p>
+          <a:p>
+            <a:endParaRPr lang="en-US" dirty="0"/>
+          </a:p>
+          <a:p>
+            <a:r>
+              <a:rPr lang="en-US" dirty="0"/>
+              <a:t>From here, a Feasibility Analysis Tool will be developed to </a:t>
+            </a:r>
+            <a:r>
+              <a:rPr lang="en-US" dirty="0" err="1"/>
+              <a:t>downselect</a:t>
+            </a:r>
+            <a:r>
+              <a:rPr lang="en-US" dirty="0"/>
+              <a:t> a design for the Container Technology System and the Container Orchestration System that is optimal according to the most critical requirements and desirable project objectives. </a:t>
+            </a:r>
           </a:p>
         </p:txBody>
       </p:sp>
@@ -1969,7 +2082,7 @@
           <a:bodyPr/>
           <a:lstStyle/>
           <a:p>
-            <a:fld id="{16700A8E-B3A9-9C49-B741-F4BFD70CC559}" type="slidenum">
+            <a:fld id="{406A5E4B-0CAD-DE41-9697-DAE3CDD53949}" type="slidenum">
               <a:rPr lang="en-US" smtClean="0"/>
               <a:t>9</a:t>
             </a:fld>
@@ -1980,7 +2093,7 @@
     </p:spTree>
     <p:extLst>
       <p:ext uri="{BB962C8B-B14F-4D97-AF65-F5344CB8AC3E}">
-        <p14:creationId xmlns:p14="http://schemas.microsoft.com/office/powerpoint/2010/main" val="3028255286"/>
+        <p14:creationId xmlns:p14="http://schemas.microsoft.com/office/powerpoint/2010/main" val="1801297930"/>
       </p:ext>
     </p:extLst>
   </p:cSld>
@@ -2137,7 +2250,7 @@
           <a:p>
             <a:fld id="{4F1796A8-0BD5-0C4B-8897-6556AC75F079}" type="datetimeFigureOut">
               <a:rPr lang="en-US" smtClean="0"/>
-              <a:t>5/3/23</a:t>
+              <a:t>5/27/23</a:t>
             </a:fld>
             <a:endParaRPr lang="en-US"/>
           </a:p>
@@ -2335,7 +2448,7 @@
           <a:p>
             <a:fld id="{4F1796A8-0BD5-0C4B-8897-6556AC75F079}" type="datetimeFigureOut">
               <a:rPr lang="en-US" smtClean="0"/>
-              <a:t>5/3/23</a:t>
+              <a:t>5/27/23</a:t>
             </a:fld>
             <a:endParaRPr lang="en-US"/>
           </a:p>
@@ -2543,7 +2656,7 @@
           <a:p>
             <a:fld id="{4F1796A8-0BD5-0C4B-8897-6556AC75F079}" type="datetimeFigureOut">
               <a:rPr lang="en-US" smtClean="0"/>
-              <a:t>5/3/23</a:t>
+              <a:t>5/27/23</a:t>
             </a:fld>
             <a:endParaRPr lang="en-US"/>
           </a:p>
@@ -2741,7 +2854,7 @@
           <a:p>
             <a:fld id="{4F1796A8-0BD5-0C4B-8897-6556AC75F079}" type="datetimeFigureOut">
               <a:rPr lang="en-US" smtClean="0"/>
-              <a:t>5/3/23</a:t>
+              <a:t>5/27/23</a:t>
             </a:fld>
             <a:endParaRPr lang="en-US"/>
           </a:p>
@@ -3016,7 +3129,7 @@
           <a:p>
             <a:fld id="{4F1796A8-0BD5-0C4B-8897-6556AC75F079}" type="datetimeFigureOut">
               <a:rPr lang="en-US" smtClean="0"/>
-              <a:t>5/3/23</a:t>
+              <a:t>5/27/23</a:t>
             </a:fld>
             <a:endParaRPr lang="en-US"/>
           </a:p>
@@ -3281,7 +3394,7 @@
           <a:p>
             <a:fld id="{4F1796A8-0BD5-0C4B-8897-6556AC75F079}" type="datetimeFigureOut">
               <a:rPr lang="en-US" smtClean="0"/>
-              <a:t>5/3/23</a:t>
+              <a:t>5/27/23</a:t>
             </a:fld>
             <a:endParaRPr lang="en-US"/>
           </a:p>
@@ -3693,7 +3806,7 @@
           <a:p>
             <a:fld id="{4F1796A8-0BD5-0C4B-8897-6556AC75F079}" type="datetimeFigureOut">
               <a:rPr lang="en-US" smtClean="0"/>
-              <a:t>5/3/23</a:t>
+              <a:t>5/27/23</a:t>
             </a:fld>
             <a:endParaRPr lang="en-US"/>
           </a:p>
@@ -3834,7 +3947,7 @@
           <a:p>
             <a:fld id="{4F1796A8-0BD5-0C4B-8897-6556AC75F079}" type="datetimeFigureOut">
               <a:rPr lang="en-US" smtClean="0"/>
-              <a:t>5/3/23</a:t>
+              <a:t>5/27/23</a:t>
             </a:fld>
             <a:endParaRPr lang="en-US"/>
           </a:p>
@@ -3947,7 +4060,7 @@
           <a:p>
             <a:fld id="{4F1796A8-0BD5-0C4B-8897-6556AC75F079}" type="datetimeFigureOut">
               <a:rPr lang="en-US" smtClean="0"/>
-              <a:t>5/3/23</a:t>
+              <a:t>5/27/23</a:t>
             </a:fld>
             <a:endParaRPr lang="en-US"/>
           </a:p>
@@ -4258,7 +4371,7 @@
           <a:p>
             <a:fld id="{4F1796A8-0BD5-0C4B-8897-6556AC75F079}" type="datetimeFigureOut">
               <a:rPr lang="en-US" smtClean="0"/>
-              <a:t>5/3/23</a:t>
+              <a:t>5/27/23</a:t>
             </a:fld>
             <a:endParaRPr lang="en-US"/>
           </a:p>
@@ -4546,7 +4659,7 @@
           <a:p>
             <a:fld id="{4F1796A8-0BD5-0C4B-8897-6556AC75F079}" type="datetimeFigureOut">
               <a:rPr lang="en-US" smtClean="0"/>
-              <a:t>5/3/23</a:t>
+              <a:t>5/27/23</a:t>
             </a:fld>
             <a:endParaRPr lang="en-US"/>
           </a:p>
@@ -4787,7 +4900,7 @@
           <a:p>
             <a:fld id="{4F1796A8-0BD5-0C4B-8897-6556AC75F079}" type="datetimeFigureOut">
               <a:rPr lang="en-US" smtClean="0"/>
-              <a:t>5/3/23</a:t>
+              <a:t>5/27/23</a:t>
             </a:fld>
             <a:endParaRPr lang="en-US"/>
           </a:p>
@@ -5225,7 +5338,7 @@
         </p:blipFill>
         <p:spPr>
           <a:xfrm>
-            <a:off x="-3047" y="10"/>
+            <a:off x="8528" y="9949"/>
             <a:ext cx="12191999" cy="6857990"/>
           </a:xfrm>
           <a:prstGeom prst="rect">
@@ -5251,7 +5364,7 @@
         </p:nvSpPr>
         <p:spPr>
           <a:xfrm>
-            <a:off x="1063752" y="2138267"/>
+            <a:off x="1207187" y="2819294"/>
             <a:ext cx="10058400" cy="1219411"/>
           </a:xfrm>
           <a:effectLst>
@@ -5269,20 +5382,12 @@
           <a:lstStyle/>
           <a:p>
             <a:r>
-              <a:rPr lang="en-US" sz="5200" dirty="0" err="1">
-                <a:solidFill>
-                  <a:srgbClr val="FFFFFF"/>
-                </a:solidFill>
-              </a:rPr>
-              <a:t>MITgcm</a:t>
-            </a:r>
-            <a:r>
               <a:rPr lang="en-US" sz="5200" dirty="0">
                 <a:solidFill>
                   <a:srgbClr val="FFFFFF"/>
                 </a:solidFill>
               </a:rPr>
-              <a:t>-Docker Project: Product Design Overview</a:t>
+              <a:t>Ocean Circulation Model Containerization Product Design Overview</a:t>
             </a:r>
           </a:p>
         </p:txBody>
@@ -5305,8 +5410,8 @@
         </p:nvSpPr>
         <p:spPr>
           <a:xfrm>
-            <a:off x="1063752" y="5495934"/>
-            <a:ext cx="10058400" cy="1282707"/>
+            <a:off x="2383825" y="5393916"/>
+            <a:ext cx="7418253" cy="1282707"/>
           </a:xfrm>
           <a:effectLst>
             <a:outerShdw blurRad="50800" dist="38100" dir="2700000" algn="tl" rotWithShape="0">
@@ -5323,26 +5428,41 @@
           <a:lstStyle/>
           <a:p>
             <a:r>
-              <a:rPr lang="en-US" dirty="0">
+              <a:rPr lang="en-US" sz="2000" dirty="0">
                 <a:solidFill>
                   <a:srgbClr val="FFFFFF"/>
                 </a:solidFill>
               </a:rPr>
-              <a:t>By: Justin Campbell</a:t>
-            </a:r>
+              <a:t>By: Justin Campbell, Research Engineering/Scientist Assistant with Computational Research in Ice and Ocean Systems (CRIOS) Group</a:t>
+            </a:r>
+          </a:p>
+          <a:p>
+            <a:endParaRPr lang="en-US" dirty="0">
+              <a:solidFill>
+                <a:srgbClr val="FFFFFF"/>
+              </a:solidFill>
+            </a:endParaRPr>
           </a:p>
         </p:txBody>
       </p:sp>
     </p:spTree>
     <p:extLst>
       <p:ext uri="{BB962C8B-B14F-4D97-AF65-F5344CB8AC3E}">
-        <p14:creationId xmlns:p14="http://schemas.microsoft.com/office/powerpoint/2010/main" val="3004535359"/>
+        <p14:creationId xmlns:p14="http://schemas.microsoft.com/office/powerpoint/2010/main" val="2800846622"/>
       </p:ext>
     </p:extLst>
   </p:cSld>
   <p:clrMapOvr>
     <a:masterClrMapping/>
   </p:clrMapOvr>
+  <mc:AlternateContent xmlns:mc="http://schemas.openxmlformats.org/markup-compatibility/2006" xmlns:p14="http://schemas.microsoft.com/office/powerpoint/2010/main">
+    <mc:Choice Requires="p14">
+      <p:transition spd="slow" p14:dur="2000" advTm="4133"/>
+    </mc:Choice>
+    <mc:Fallback xmlns="">
+      <p:transition spd="slow" advTm="4133"/>
+    </mc:Fallback>
+  </mc:AlternateContent>
 </p:sld>
 </file>
 
@@ -5368,7 +5488,7 @@
           <p:cNvPr id="2" name="Title 1">
             <a:extLst>
               <a:ext uri="{FF2B5EF4-FFF2-40B4-BE49-F238E27FC236}">
-                <a16:creationId xmlns:a16="http://schemas.microsoft.com/office/drawing/2014/main" id="{44270323-4060-4768-8070-5B5619176936}"/>
+                <a16:creationId xmlns:a16="http://schemas.microsoft.com/office/drawing/2014/main" id="{2366A68F-15F1-85B1-99FA-1E55C24D5120}"/>
               </a:ext>
             </a:extLst>
           </p:cNvPr>
@@ -5384,115 +5504,25 @@
           <a:bodyPr/>
           <a:lstStyle/>
           <a:p>
-            <a:r>
-              <a:rPr lang="en-US" dirty="0"/>
-              <a:t>Top-Down Product Overview</a:t>
-            </a:r>
-          </a:p>
-        </p:txBody>
-      </p:sp>
-      <p:sp>
-        <p:nvSpPr>
-          <p:cNvPr id="3" name="Content Placeholder 2">
-            <a:extLst>
-              <a:ext uri="{FF2B5EF4-FFF2-40B4-BE49-F238E27FC236}">
-                <a16:creationId xmlns:a16="http://schemas.microsoft.com/office/drawing/2014/main" id="{432D0A2A-4D75-823A-E0AE-BF7BFFD53338}"/>
-              </a:ext>
-            </a:extLst>
-          </p:cNvPr>
-          <p:cNvSpPr>
-            <a:spLocks noGrp="1"/>
-          </p:cNvSpPr>
-          <p:nvPr>
-            <p:ph idx="1"/>
-          </p:nvPr>
-        </p:nvSpPr>
-        <p:spPr/>
-        <p:txBody>
-          <a:bodyPr/>
-          <a:lstStyle/>
-          <a:p>
             <a:endParaRPr lang="en-US"/>
-          </a:p>
-        </p:txBody>
-      </p:sp>
-    </p:spTree>
-    <p:extLst>
-      <p:ext uri="{BB962C8B-B14F-4D97-AF65-F5344CB8AC3E}">
-        <p14:creationId xmlns:p14="http://schemas.microsoft.com/office/powerpoint/2010/main" val="2253226216"/>
-      </p:ext>
-    </p:extLst>
-  </p:cSld>
-  <p:clrMapOvr>
-    <a:masterClrMapping/>
-  </p:clrMapOvr>
-</p:sld>
-</file>
-
-<file path=ppt/slides/slide11.xml><?xml version="1.0" encoding="utf-8"?>
-<p:sld xmlns:a="http://schemas.openxmlformats.org/drawingml/2006/main" xmlns:r="http://schemas.openxmlformats.org/officeDocument/2006/relationships" xmlns:p="http://schemas.openxmlformats.org/presentationml/2006/main">
-  <p:cSld>
-    <p:spTree>
-      <p:nvGrpSpPr>
-        <p:cNvPr id="1" name=""/>
-        <p:cNvGrpSpPr/>
-        <p:nvPr/>
-      </p:nvGrpSpPr>
-      <p:grpSpPr>
-        <a:xfrm>
-          <a:off x="0" y="0"/>
-          <a:ext cx="0" cy="0"/>
-          <a:chOff x="0" y="0"/>
-          <a:chExt cx="0" cy="0"/>
-        </a:xfrm>
-      </p:grpSpPr>
-      <p:sp>
-        <p:nvSpPr>
-          <p:cNvPr id="11" name="Title 10">
-            <a:extLst>
-              <a:ext uri="{FF2B5EF4-FFF2-40B4-BE49-F238E27FC236}">
-                <a16:creationId xmlns:a16="http://schemas.microsoft.com/office/drawing/2014/main" id="{B1748D03-7FB0-516E-DCC3-DBFD7C2DF205}"/>
-              </a:ext>
-            </a:extLst>
-          </p:cNvPr>
-          <p:cNvSpPr>
-            <a:spLocks noGrp="1"/>
-          </p:cNvSpPr>
-          <p:nvPr>
-            <p:ph type="title"/>
-          </p:nvPr>
-        </p:nvSpPr>
-        <p:spPr>
-          <a:xfrm>
-            <a:off x="838198" y="1"/>
-            <a:ext cx="10515600" cy="733246"/>
-          </a:xfrm>
-        </p:spPr>
-        <p:txBody>
-          <a:bodyPr/>
-          <a:lstStyle/>
-          <a:p>
-            <a:pPr algn="ctr"/>
-            <a:r>
-              <a:rPr lang="en-US" dirty="0"/>
-              <a:t>Next Steps</a:t>
-            </a:r>
           </a:p>
         </p:txBody>
       </p:sp>
       <p:pic>
         <p:nvPicPr>
-          <p:cNvPr id="20" name="Content Placeholder 4" descr="A body of water with blue sky and clouds&#10;&#10;Description automatically generated with low confidence">
-            <a:extLst>
-              <a:ext uri="{FF2B5EF4-FFF2-40B4-BE49-F238E27FC236}">
-                <a16:creationId xmlns:a16="http://schemas.microsoft.com/office/drawing/2014/main" id="{1758AB50-27A2-F679-EA0A-9A6B42A7786A}"/>
+          <p:cNvPr id="5" name="Content Placeholder 4" descr="A body of water with blue sky and clouds&#10;&#10;Description automatically generated with low confidence">
+            <a:extLst>
+              <a:ext uri="{FF2B5EF4-FFF2-40B4-BE49-F238E27FC236}">
+                <a16:creationId xmlns:a16="http://schemas.microsoft.com/office/drawing/2014/main" id="{47FB3BC2-9B81-1AE2-20B5-04E9A9133CAB}"/>
               </a:ext>
             </a:extLst>
           </p:cNvPr>
           <p:cNvPicPr>
-            <a:picLocks noChangeAspect="1"/>
+            <a:picLocks noGrp="1" noChangeAspect="1"/>
           </p:cNvPicPr>
-          <p:nvPr/>
+          <p:nvPr>
+            <p:ph idx="1"/>
+          </p:nvPr>
         </p:nvPicPr>
         <p:blipFill rotWithShape="1">
           <a:blip r:embed="rId3"/>
@@ -5501,20 +5531,17 @@
         </p:blipFill>
         <p:spPr>
           <a:xfrm>
-            <a:off x="0" y="-36074"/>
-            <a:ext cx="12365152" cy="6858000"/>
+            <a:off x="-1" y="0"/>
+            <a:ext cx="12365151" cy="6858000"/>
           </a:xfrm>
-          <a:prstGeom prst="rect">
-            <a:avLst/>
-          </a:prstGeom>
         </p:spPr>
       </p:pic>
       <p:sp>
         <p:nvSpPr>
-          <p:cNvPr id="21" name="TextBox 20">
-            <a:extLst>
-              <a:ext uri="{FF2B5EF4-FFF2-40B4-BE49-F238E27FC236}">
-                <a16:creationId xmlns:a16="http://schemas.microsoft.com/office/drawing/2014/main" id="{97194565-9712-60A5-602B-34E3E5171064}"/>
+          <p:cNvPr id="6" name="TextBox 5">
+            <a:extLst>
+              <a:ext uri="{FF2B5EF4-FFF2-40B4-BE49-F238E27FC236}">
+                <a16:creationId xmlns:a16="http://schemas.microsoft.com/office/drawing/2014/main" id="{7EEBC945-BCD1-972E-F326-2AD0A0317191}"/>
               </a:ext>
             </a:extLst>
           </p:cNvPr>
@@ -5523,8 +5550,8 @@
         </p:nvSpPr>
         <p:spPr>
           <a:xfrm>
-            <a:off x="1" y="1109541"/>
-            <a:ext cx="12191999" cy="4893647"/>
+            <a:off x="4213412" y="0"/>
+            <a:ext cx="3747247" cy="769441"/>
           </a:xfrm>
           <a:prstGeom prst="rect">
             <a:avLst/>
@@ -5532,136 +5559,29 @@
           <a:noFill/>
         </p:spPr>
         <p:txBody>
-          <a:bodyPr wrap="square">
+          <a:bodyPr wrap="square" rtlCol="0">
             <a:spAutoFit/>
           </a:bodyPr>
           <a:lstStyle/>
           <a:p>
-            <a:pPr marL="457200" indent="-457200">
-              <a:buFont typeface="Arial" panose="020B0604020202020204" pitchFamily="34" charset="0"/>
-              <a:buChar char="•"/>
-            </a:pPr>
-            <a:r>
-              <a:rPr lang="en-US" sz="2400" dirty="0">
+            <a:pPr algn="ctr"/>
+            <a:r>
+              <a:rPr lang="en-US" sz="4400" dirty="0">
                 <a:solidFill>
                   <a:schemeClr val="bg1"/>
                 </a:solidFill>
               </a:rPr>
-              <a:t>Finalize and document rudimentary product design and product system design schematics </a:t>
-            </a:r>
-          </a:p>
-          <a:p>
-            <a:pPr marL="457200" indent="-457200">
-              <a:buFont typeface="Arial" panose="020B0604020202020204" pitchFamily="34" charset="0"/>
-              <a:buChar char="•"/>
-            </a:pPr>
-            <a:endParaRPr lang="en-US" sz="2400" dirty="0">
-              <a:solidFill>
-                <a:schemeClr val="bg1"/>
-              </a:solidFill>
-            </a:endParaRPr>
-          </a:p>
-          <a:p>
-            <a:endParaRPr lang="en-US" sz="2400" dirty="0">
-              <a:solidFill>
-                <a:schemeClr val="bg1"/>
-              </a:solidFill>
-            </a:endParaRPr>
-          </a:p>
-          <a:p>
-            <a:pPr marL="457200" indent="-457200">
-              <a:buFont typeface="Arial" panose="020B0604020202020204" pitchFamily="34" charset="0"/>
-              <a:buChar char="•"/>
-            </a:pPr>
-            <a:r>
-              <a:rPr lang="en-US" sz="2400" dirty="0">
-                <a:solidFill>
-                  <a:schemeClr val="bg1"/>
-                </a:solidFill>
-              </a:rPr>
-              <a:t>Develop preliminary designs by implementing product and system designs into platform-specific architectures</a:t>
-            </a:r>
-          </a:p>
-          <a:p>
-            <a:endParaRPr lang="en-US" sz="2400" dirty="0">
-              <a:solidFill>
-                <a:schemeClr val="bg1"/>
-              </a:solidFill>
-            </a:endParaRPr>
-          </a:p>
-          <a:p>
-            <a:endParaRPr lang="en-US" sz="2400" dirty="0">
-              <a:solidFill>
-                <a:schemeClr val="bg1"/>
-              </a:solidFill>
-            </a:endParaRPr>
-          </a:p>
-          <a:p>
-            <a:pPr marL="457200" indent="-457200">
-              <a:buFont typeface="Arial" panose="020B0604020202020204" pitchFamily="34" charset="0"/>
-              <a:buChar char="•"/>
-            </a:pPr>
-            <a:r>
-              <a:rPr lang="en-US" sz="2400" dirty="0">
-                <a:solidFill>
-                  <a:schemeClr val="bg1"/>
-                </a:solidFill>
-              </a:rPr>
-              <a:t>Test behavior of preliminary designs and use results to weigh strengths/weaknesses of designs and check designs against requirements</a:t>
-            </a:r>
-          </a:p>
-          <a:p>
-            <a:endParaRPr lang="en-US" sz="2400" dirty="0">
-              <a:solidFill>
-                <a:schemeClr val="bg1"/>
-              </a:solidFill>
-            </a:endParaRPr>
-          </a:p>
-          <a:p>
-            <a:endParaRPr lang="en-US" sz="2400" dirty="0">
-              <a:solidFill>
-                <a:schemeClr val="bg1"/>
-              </a:solidFill>
-            </a:endParaRPr>
-          </a:p>
-          <a:p>
-            <a:pPr marL="457200" indent="-457200">
-              <a:buFont typeface="Arial" panose="020B0604020202020204" pitchFamily="34" charset="0"/>
-              <a:buChar char="•"/>
-            </a:pPr>
-            <a:r>
-              <a:rPr lang="en-US" sz="2400" dirty="0">
-                <a:solidFill>
-                  <a:schemeClr val="bg1"/>
-                </a:solidFill>
-              </a:rPr>
-              <a:t>Design and implement Feasibility Tool(s) to </a:t>
-            </a:r>
-            <a:r>
-              <a:rPr lang="en-US" sz="2400" dirty="0" err="1">
-                <a:solidFill>
-                  <a:schemeClr val="bg1"/>
-                </a:solidFill>
-              </a:rPr>
-              <a:t>downselect</a:t>
-            </a:r>
-            <a:r>
-              <a:rPr lang="en-US" sz="2400" dirty="0">
-                <a:solidFill>
-                  <a:schemeClr val="bg1"/>
-                </a:solidFill>
-              </a:rPr>
-              <a:t> designs that are desirable according to requirement validation and project objectives</a:t>
-            </a:r>
-          </a:p>
-        </p:txBody>
-      </p:sp>
-      <p:sp>
-        <p:nvSpPr>
-          <p:cNvPr id="22" name="TextBox 21">
-            <a:extLst>
-              <a:ext uri="{FF2B5EF4-FFF2-40B4-BE49-F238E27FC236}">
-                <a16:creationId xmlns:a16="http://schemas.microsoft.com/office/drawing/2014/main" id="{D393A796-A6DC-7BA0-42EB-E38FAD3D81B0}"/>
+              <a:t>References</a:t>
+            </a:r>
+          </a:p>
+        </p:txBody>
+      </p:sp>
+      <p:sp>
+        <p:nvSpPr>
+          <p:cNvPr id="8" name="TextBox 7">
+            <a:extLst>
+              <a:ext uri="{FF2B5EF4-FFF2-40B4-BE49-F238E27FC236}">
+                <a16:creationId xmlns:a16="http://schemas.microsoft.com/office/drawing/2014/main" id="{5DD0ECD5-C2BC-F2CE-F521-5BC364B065CD}"/>
               </a:ext>
             </a:extLst>
           </p:cNvPr>
@@ -5670,8 +5590,8 @@
         </p:nvSpPr>
         <p:spPr>
           <a:xfrm>
-            <a:off x="4536138" y="57509"/>
-            <a:ext cx="3119717" cy="769441"/>
+            <a:off x="9599" y="1137563"/>
+            <a:ext cx="12355551" cy="4801314"/>
           </a:xfrm>
           <a:prstGeom prst="rect">
             <a:avLst/>
@@ -5684,105 +5604,456 @@
           </a:bodyPr>
           <a:lstStyle/>
           <a:p>
-            <a:pPr algn="ctr"/>
-            <a:r>
-              <a:rPr lang="en-US" sz="4400" dirty="0">
+            <a:pPr marL="342900" indent="-342900">
+              <a:buFont typeface="+mj-lt"/>
+              <a:buAutoNum type="arabicPeriod"/>
+            </a:pPr>
+            <a:r>
+              <a:rPr lang="en-US" dirty="0">
                 <a:solidFill>
                   <a:schemeClr val="bg1"/>
                 </a:solidFill>
               </a:rPr>
-              <a:t>Next Steps</a:t>
-            </a:r>
+              <a:t>“MITGCM.” </a:t>
+            </a:r>
+            <a:r>
+              <a:rPr lang="en-US" dirty="0" err="1">
+                <a:solidFill>
+                  <a:schemeClr val="bg1"/>
+                </a:solidFill>
+              </a:rPr>
+              <a:t>MITgcm</a:t>
+            </a:r>
+            <a:r>
+              <a:rPr lang="en-US" dirty="0">
+                <a:solidFill>
+                  <a:schemeClr val="bg1"/>
+                </a:solidFill>
+              </a:rPr>
+              <a:t>, https://</a:t>
+            </a:r>
+            <a:r>
+              <a:rPr lang="en-US" dirty="0" err="1">
+                <a:solidFill>
+                  <a:schemeClr val="bg1"/>
+                </a:solidFill>
+              </a:rPr>
+              <a:t>mitgcm.org</a:t>
+            </a:r>
+            <a:r>
+              <a:rPr lang="en-US" dirty="0">
+                <a:solidFill>
+                  <a:schemeClr val="bg1"/>
+                </a:solidFill>
+              </a:rPr>
+              <a:t>/. </a:t>
+            </a:r>
+          </a:p>
+          <a:p>
+            <a:pPr marL="342900" indent="-342900">
+              <a:buFont typeface="+mj-lt"/>
+              <a:buAutoNum type="arabicPeriod"/>
+            </a:pPr>
+            <a:r>
+              <a:rPr lang="en-US" dirty="0">
+                <a:solidFill>
+                  <a:schemeClr val="bg1"/>
+                </a:solidFill>
+              </a:rPr>
+              <a:t>“JPL Science: Ecco.” NASA, NASA, https://</a:t>
+            </a:r>
+            <a:r>
+              <a:rPr lang="en-US" dirty="0" err="1">
+                <a:solidFill>
+                  <a:schemeClr val="bg1"/>
+                </a:solidFill>
+              </a:rPr>
+              <a:t>science.jpl.nasa.gov</a:t>
+            </a:r>
+            <a:r>
+              <a:rPr lang="en-US" dirty="0">
+                <a:solidFill>
+                  <a:schemeClr val="bg1"/>
+                </a:solidFill>
+              </a:rPr>
+              <a:t>/projects/</a:t>
+            </a:r>
+            <a:r>
+              <a:rPr lang="en-US" dirty="0" err="1">
+                <a:solidFill>
+                  <a:schemeClr val="bg1"/>
+                </a:solidFill>
+              </a:rPr>
+              <a:t>ecco</a:t>
+            </a:r>
+            <a:r>
+              <a:rPr lang="en-US" dirty="0">
+                <a:solidFill>
+                  <a:schemeClr val="bg1"/>
+                </a:solidFill>
+              </a:rPr>
+              <a:t>/. </a:t>
+            </a:r>
+          </a:p>
+          <a:p>
+            <a:pPr marL="342900" indent="-342900">
+              <a:buFont typeface="+mj-lt"/>
+              <a:buAutoNum type="arabicPeriod"/>
+            </a:pPr>
+            <a:r>
+              <a:rPr lang="en-US" dirty="0">
+                <a:solidFill>
+                  <a:schemeClr val="bg1"/>
+                </a:solidFill>
+                <a:effectLst/>
+              </a:rPr>
+              <a:t>Helmenstine, Anne Marie. “Why Is the Ocean Blue? Here's How It Works.” </a:t>
+            </a:r>
+            <a:r>
+              <a:rPr lang="en-US" i="1" dirty="0">
+                <a:solidFill>
+                  <a:schemeClr val="bg1"/>
+                </a:solidFill>
+                <a:effectLst/>
+              </a:rPr>
+              <a:t>ThoughtCo</a:t>
+            </a:r>
+            <a:r>
+              <a:rPr lang="en-US" dirty="0">
+                <a:solidFill>
+                  <a:schemeClr val="bg1"/>
+                </a:solidFill>
+                <a:effectLst/>
+              </a:rPr>
+              <a:t>, ThoughtCo, 11 July 2022, https://</a:t>
+            </a:r>
+            <a:r>
+              <a:rPr lang="en-US" dirty="0" err="1">
+                <a:solidFill>
+                  <a:schemeClr val="bg1"/>
+                </a:solidFill>
+                <a:effectLst/>
+              </a:rPr>
+              <a:t>www.thoughtco.com</a:t>
+            </a:r>
+            <a:r>
+              <a:rPr lang="en-US" dirty="0">
+                <a:solidFill>
+                  <a:schemeClr val="bg1"/>
+                </a:solidFill>
+                <a:effectLst/>
+              </a:rPr>
+              <a:t>/why-is-the-ocean-blue-609420. </a:t>
+            </a:r>
+          </a:p>
+          <a:p>
+            <a:pPr marL="342900" indent="-342900">
+              <a:buFont typeface="+mj-lt"/>
+              <a:buAutoNum type="arabicPeriod"/>
+            </a:pPr>
+            <a:r>
+              <a:rPr lang="en-US" dirty="0">
+                <a:solidFill>
+                  <a:schemeClr val="bg1"/>
+                </a:solidFill>
+                <a:effectLst/>
+              </a:rPr>
+              <a:t>Dwyer, Susanne. “Are You Still on Target to Meet Your Goal?” </a:t>
+            </a:r>
+            <a:r>
+              <a:rPr lang="en-US" i="1" dirty="0" err="1">
+                <a:solidFill>
+                  <a:schemeClr val="bg1"/>
+                </a:solidFill>
+                <a:effectLst/>
+              </a:rPr>
+              <a:t>RISMedia</a:t>
+            </a:r>
+            <a:r>
+              <a:rPr lang="en-US" dirty="0">
+                <a:solidFill>
+                  <a:schemeClr val="bg1"/>
+                </a:solidFill>
+                <a:effectLst/>
+              </a:rPr>
+              <a:t>, </a:t>
+            </a:r>
+            <a:r>
+              <a:rPr lang="en-US" dirty="0" err="1">
+                <a:solidFill>
+                  <a:schemeClr val="bg1"/>
+                </a:solidFill>
+                <a:effectLst/>
+              </a:rPr>
+              <a:t>RISMedia</a:t>
+            </a:r>
+            <a:r>
+              <a:rPr lang="en-US" dirty="0">
+                <a:solidFill>
+                  <a:schemeClr val="bg1"/>
+                </a:solidFill>
+                <a:effectLst/>
+              </a:rPr>
+              <a:t>, 13 June 2019, https://</a:t>
+            </a:r>
+            <a:r>
+              <a:rPr lang="en-US" dirty="0" err="1">
+                <a:solidFill>
+                  <a:schemeClr val="bg1"/>
+                </a:solidFill>
+                <a:effectLst/>
+              </a:rPr>
+              <a:t>www.rismedia.com</a:t>
+            </a:r>
+            <a:r>
+              <a:rPr lang="en-US" dirty="0">
+                <a:solidFill>
+                  <a:schemeClr val="bg1"/>
+                </a:solidFill>
+                <a:effectLst/>
+              </a:rPr>
+              <a:t>/2019/06/13/target-goal/. </a:t>
+            </a:r>
+          </a:p>
+          <a:p>
+            <a:pPr marL="342900" indent="-342900">
+              <a:buFont typeface="+mj-lt"/>
+              <a:buAutoNum type="arabicPeriod"/>
+            </a:pPr>
+            <a:r>
+              <a:rPr lang="en-US" dirty="0">
+                <a:solidFill>
+                  <a:schemeClr val="bg1"/>
+                </a:solidFill>
+                <a:effectLst/>
+              </a:rPr>
+              <a:t>Lean East. “Setting Objectives: Measure What Matters.” </a:t>
+            </a:r>
+            <a:r>
+              <a:rPr lang="en-US" i="1" dirty="0">
+                <a:solidFill>
+                  <a:schemeClr val="bg1"/>
+                </a:solidFill>
+                <a:effectLst/>
+              </a:rPr>
+              <a:t>Lean East</a:t>
+            </a:r>
+            <a:r>
+              <a:rPr lang="en-US" dirty="0">
+                <a:solidFill>
+                  <a:schemeClr val="bg1"/>
+                </a:solidFill>
+                <a:effectLst/>
+              </a:rPr>
+              <a:t>, Lean East, 25 Mar. 2022, https://</a:t>
+            </a:r>
+            <a:r>
+              <a:rPr lang="en-US" dirty="0" err="1">
+                <a:solidFill>
+                  <a:schemeClr val="bg1"/>
+                </a:solidFill>
+                <a:effectLst/>
+              </a:rPr>
+              <a:t>www.leaneast.com</a:t>
+            </a:r>
+            <a:r>
+              <a:rPr lang="en-US" dirty="0">
+                <a:solidFill>
+                  <a:schemeClr val="bg1"/>
+                </a:solidFill>
+                <a:effectLst/>
+              </a:rPr>
+              <a:t>/setting-objectives. </a:t>
+            </a:r>
+          </a:p>
+          <a:p>
+            <a:pPr marL="342900" indent="-342900">
+              <a:buFont typeface="+mj-lt"/>
+              <a:buAutoNum type="arabicPeriod"/>
+            </a:pPr>
+            <a:r>
+              <a:rPr lang="en-US" dirty="0">
+                <a:solidFill>
+                  <a:schemeClr val="bg1"/>
+                </a:solidFill>
+                <a:effectLst/>
+              </a:rPr>
+              <a:t>Asana, Team. “How to Set &amp; Track Stretch Goals to Inspire Your Team [2023] [2022] • Asana.” </a:t>
+            </a:r>
+            <a:r>
+              <a:rPr lang="en-US" i="1" dirty="0">
+                <a:solidFill>
+                  <a:schemeClr val="bg1"/>
+                </a:solidFill>
+                <a:effectLst/>
+              </a:rPr>
+              <a:t>Asana</a:t>
+            </a:r>
+            <a:r>
+              <a:rPr lang="en-US" dirty="0">
+                <a:solidFill>
+                  <a:schemeClr val="bg1"/>
+                </a:solidFill>
+                <a:effectLst/>
+              </a:rPr>
+              <a:t>, Asana, 19 Nov. 2022, https://</a:t>
+            </a:r>
+            <a:r>
+              <a:rPr lang="en-US" dirty="0" err="1">
+                <a:solidFill>
+                  <a:schemeClr val="bg1"/>
+                </a:solidFill>
+                <a:effectLst/>
+              </a:rPr>
+              <a:t>asana.com</a:t>
+            </a:r>
+            <a:r>
+              <a:rPr lang="en-US" dirty="0">
+                <a:solidFill>
+                  <a:schemeClr val="bg1"/>
+                </a:solidFill>
+                <a:effectLst/>
+              </a:rPr>
+              <a:t>/resources/stretch-goals. </a:t>
+            </a:r>
+          </a:p>
+          <a:p>
+            <a:pPr marL="342900" indent="-342900">
+              <a:buFont typeface="+mj-lt"/>
+              <a:buAutoNum type="arabicPeriod"/>
+            </a:pPr>
+            <a:r>
+              <a:rPr lang="en-US" dirty="0" err="1">
+                <a:solidFill>
+                  <a:schemeClr val="bg1"/>
+                </a:solidFill>
+              </a:rPr>
+              <a:t>Boulouet</a:t>
+            </a:r>
+            <a:r>
+              <a:rPr lang="en-US" dirty="0">
+                <a:solidFill>
+                  <a:schemeClr val="bg1"/>
+                </a:solidFill>
+              </a:rPr>
+              <a:t>, Henri. “Clear Requirement.” LinkedIn, 6 July 2022, </a:t>
+            </a:r>
+            <a:r>
+              <a:rPr lang="en-US" dirty="0" err="1">
+                <a:solidFill>
+                  <a:schemeClr val="bg1"/>
+                </a:solidFill>
+              </a:rPr>
+              <a:t>www.linkedin.com</a:t>
+            </a:r>
+            <a:r>
+              <a:rPr lang="en-US" dirty="0">
+                <a:solidFill>
+                  <a:schemeClr val="bg1"/>
+                </a:solidFill>
+              </a:rPr>
+              <a:t>/pulse/clear-requirement-</a:t>
+            </a:r>
+            <a:r>
+              <a:rPr lang="en-US" dirty="0" err="1">
+                <a:solidFill>
+                  <a:schemeClr val="bg1"/>
+                </a:solidFill>
+              </a:rPr>
+              <a:t>henri</a:t>
+            </a:r>
+            <a:r>
+              <a:rPr lang="en-US" dirty="0">
+                <a:solidFill>
+                  <a:schemeClr val="bg1"/>
+                </a:solidFill>
+              </a:rPr>
+              <a:t>-</a:t>
+            </a:r>
+            <a:r>
+              <a:rPr lang="en-US" dirty="0" err="1">
+                <a:solidFill>
+                  <a:schemeClr val="bg1"/>
+                </a:solidFill>
+              </a:rPr>
+              <a:t>boulouet</a:t>
+            </a:r>
+            <a:r>
+              <a:rPr lang="en-US" dirty="0">
+                <a:solidFill>
+                  <a:schemeClr val="bg1"/>
+                </a:solidFill>
+              </a:rPr>
+              <a:t>/. </a:t>
+            </a:r>
+          </a:p>
+          <a:p>
+            <a:pPr marL="342900" indent="-342900">
+              <a:buFont typeface="+mj-lt"/>
+              <a:buAutoNum type="arabicPeriod"/>
+            </a:pPr>
+            <a:endParaRPr lang="en-US" dirty="0">
+              <a:solidFill>
+                <a:schemeClr val="bg1"/>
+              </a:solidFill>
+              <a:effectLst/>
+            </a:endParaRPr>
+          </a:p>
+          <a:p>
+            <a:pPr marL="342900" indent="-342900">
+              <a:buFont typeface="+mj-lt"/>
+              <a:buAutoNum type="arabicPeriod"/>
+            </a:pPr>
+            <a:endParaRPr lang="en-US" dirty="0">
+              <a:effectLst/>
+            </a:endParaRPr>
+          </a:p>
+          <a:p>
+            <a:pPr marL="342900" indent="-342900">
+              <a:buFont typeface="+mj-lt"/>
+              <a:buAutoNum type="arabicPeriod"/>
+            </a:pPr>
+            <a:endParaRPr lang="en-US" dirty="0">
+              <a:effectLst/>
+            </a:endParaRPr>
+          </a:p>
+          <a:p>
+            <a:pPr marL="342900" indent="-342900">
+              <a:buFont typeface="+mj-lt"/>
+              <a:buAutoNum type="arabicPeriod"/>
+            </a:pPr>
+            <a:endParaRPr lang="en-US" dirty="0">
+              <a:solidFill>
+                <a:schemeClr val="bg1"/>
+              </a:solidFill>
+              <a:effectLst/>
+            </a:endParaRPr>
+          </a:p>
+          <a:p>
+            <a:pPr marL="342900" indent="-342900">
+              <a:buFont typeface="+mj-lt"/>
+              <a:buAutoNum type="arabicPeriod"/>
+            </a:pPr>
+            <a:endParaRPr lang="en-US" dirty="0">
+              <a:solidFill>
+                <a:schemeClr val="bg1"/>
+              </a:solidFill>
+              <a:effectLst/>
+            </a:endParaRPr>
+          </a:p>
+          <a:p>
+            <a:pPr marL="342900" indent="-342900">
+              <a:buFont typeface="+mj-lt"/>
+              <a:buAutoNum type="arabicPeriod"/>
+            </a:pPr>
+            <a:endParaRPr lang="en-US" dirty="0"/>
           </a:p>
         </p:txBody>
       </p:sp>
     </p:spTree>
     <p:extLst>
       <p:ext uri="{BB962C8B-B14F-4D97-AF65-F5344CB8AC3E}">
-        <p14:creationId xmlns:p14="http://schemas.microsoft.com/office/powerpoint/2010/main" val="988854764"/>
-      </p:ext>
-    </p:extLst>
-  </p:cSld>
-  <p:clrMapOvr>
-    <a:masterClrMapping/>
-  </p:clrMapOvr>
-</p:sld>
-</file>
-
-<file path=ppt/slides/slide12.xml><?xml version="1.0" encoding="utf-8"?>
-<p:sld xmlns:a="http://schemas.openxmlformats.org/drawingml/2006/main" xmlns:r="http://schemas.openxmlformats.org/officeDocument/2006/relationships" xmlns:p="http://schemas.openxmlformats.org/presentationml/2006/main">
-  <p:cSld>
-    <p:spTree>
-      <p:nvGrpSpPr>
-        <p:cNvPr id="1" name=""/>
-        <p:cNvGrpSpPr/>
-        <p:nvPr/>
-      </p:nvGrpSpPr>
-      <p:grpSpPr>
-        <a:xfrm>
-          <a:off x="0" y="0"/>
-          <a:ext cx="0" cy="0"/>
-          <a:chOff x="0" y="0"/>
-          <a:chExt cx="0" cy="0"/>
-        </a:xfrm>
-      </p:grpSpPr>
-      <p:sp>
-        <p:nvSpPr>
-          <p:cNvPr id="2" name="Title 1">
-            <a:extLst>
-              <a:ext uri="{FF2B5EF4-FFF2-40B4-BE49-F238E27FC236}">
-                <a16:creationId xmlns:a16="http://schemas.microsoft.com/office/drawing/2014/main" id="{2EA01F6F-9417-E73E-322A-3F1805B7246D}"/>
-              </a:ext>
-            </a:extLst>
-          </p:cNvPr>
-          <p:cNvSpPr>
-            <a:spLocks noGrp="1"/>
-          </p:cNvSpPr>
-          <p:nvPr>
-            <p:ph type="title"/>
-          </p:nvPr>
-        </p:nvSpPr>
-        <p:spPr/>
-        <p:txBody>
-          <a:bodyPr/>
-          <a:lstStyle/>
-          <a:p>
-            <a:r>
-              <a:rPr lang="en-US" dirty="0"/>
-              <a:t>References</a:t>
-            </a:r>
-          </a:p>
-        </p:txBody>
-      </p:sp>
-      <p:sp>
-        <p:nvSpPr>
-          <p:cNvPr id="3" name="Content Placeholder 2">
-            <a:extLst>
-              <a:ext uri="{FF2B5EF4-FFF2-40B4-BE49-F238E27FC236}">
-                <a16:creationId xmlns:a16="http://schemas.microsoft.com/office/drawing/2014/main" id="{EECDE87B-40E7-5A8D-6242-A426ABB4ADB4}"/>
-              </a:ext>
-            </a:extLst>
-          </p:cNvPr>
-          <p:cNvSpPr>
-            <a:spLocks noGrp="1"/>
-          </p:cNvSpPr>
-          <p:nvPr>
-            <p:ph idx="1"/>
-          </p:nvPr>
-        </p:nvSpPr>
-        <p:spPr/>
-        <p:txBody>
-          <a:bodyPr/>
-          <a:lstStyle/>
-          <a:p>
-            <a:endParaRPr lang="en-US"/>
-          </a:p>
-        </p:txBody>
-      </p:sp>
-    </p:spTree>
-    <p:extLst>
-      <p:ext uri="{BB962C8B-B14F-4D97-AF65-F5344CB8AC3E}">
-        <p14:creationId xmlns:p14="http://schemas.microsoft.com/office/powerpoint/2010/main" val="1682404420"/>
+        <p14:creationId xmlns:p14="http://schemas.microsoft.com/office/powerpoint/2010/main" val="2619542427"/>
       </p:ext>
     </p:extLst>
   </p:cSld>
@@ -6889,6 +7160,1237 @@
           <a:chExt cx="0" cy="0"/>
         </a:xfrm>
       </p:grpSpPr>
+      <p:sp useBgFill="1">
+        <p:nvSpPr>
+          <p:cNvPr id="10" name="Rectangle 9">
+            <a:extLst>
+              <a:ext uri="{FF2B5EF4-FFF2-40B4-BE49-F238E27FC236}">
+                <a16:creationId xmlns:a16="http://schemas.microsoft.com/office/drawing/2014/main" id="{058A14AF-9FB5-4CC7-BA35-E8E85D3EDF0E}"/>
+              </a:ext>
+              <a:ext uri="{C183D7F6-B498-43B3-948B-1728B52AA6E4}">
+                <adec:decorative xmlns:adec="http://schemas.microsoft.com/office/drawing/2017/decorative" val="1"/>
+              </a:ext>
+            </a:extLst>
+          </p:cNvPr>
+          <p:cNvSpPr>
+            <a:spLocks noGrp="1" noRot="1" noChangeAspect="1" noMove="1" noResize="1" noEditPoints="1" noAdjustHandles="1" noChangeArrowheads="1" noChangeShapeType="1" noTextEdit="1"/>
+          </p:cNvSpPr>
+          <p:nvPr>
+            <p:extLst>
+              <p:ext uri="{386F3935-93C4-4BCD-93E2-E3B085C9AB24}">
+                <p16:designElem xmlns:p16="http://schemas.microsoft.com/office/powerpoint/2015/main" val="1"/>
+              </p:ext>
+            </p:extLst>
+          </p:nvPr>
+        </p:nvSpPr>
+        <p:spPr>
+          <a:xfrm>
+            <a:off x="0" y="0"/>
+            <a:ext cx="12191999" cy="6857365"/>
+          </a:xfrm>
+          <a:prstGeom prst="rect">
+            <a:avLst/>
+          </a:prstGeom>
+          <a:ln>
+            <a:noFill/>
+          </a:ln>
+        </p:spPr>
+        <p:style>
+          <a:lnRef idx="2">
+            <a:schemeClr val="accent1">
+              <a:shade val="50000"/>
+            </a:schemeClr>
+          </a:lnRef>
+          <a:fillRef idx="1">
+            <a:schemeClr val="accent1"/>
+          </a:fillRef>
+          <a:effectRef idx="0">
+            <a:schemeClr val="accent1"/>
+          </a:effectRef>
+          <a:fontRef idx="minor">
+            <a:schemeClr val="lt1"/>
+          </a:fontRef>
+        </p:style>
+        <p:txBody>
+          <a:bodyPr rtlCol="0" anchor="ctr"/>
+          <a:lstStyle/>
+          <a:p>
+            <a:pPr algn="ctr"/>
+            <a:endParaRPr lang="en-US"/>
+          </a:p>
+        </p:txBody>
+      </p:sp>
+      <p:sp>
+        <p:nvSpPr>
+          <p:cNvPr id="2" name="Title 1">
+            <a:extLst>
+              <a:ext uri="{FF2B5EF4-FFF2-40B4-BE49-F238E27FC236}">
+                <a16:creationId xmlns:a16="http://schemas.microsoft.com/office/drawing/2014/main" id="{023B2D3F-3660-70A8-C153-70BCCCDCC7A2}"/>
+              </a:ext>
+            </a:extLst>
+          </p:cNvPr>
+          <p:cNvSpPr>
+            <a:spLocks noGrp="1"/>
+          </p:cNvSpPr>
+          <p:nvPr>
+            <p:ph type="title"/>
+          </p:nvPr>
+        </p:nvSpPr>
+        <p:spPr>
+          <a:xfrm>
+            <a:off x="793662" y="386930"/>
+            <a:ext cx="10066122" cy="1298448"/>
+          </a:xfrm>
+        </p:spPr>
+        <p:txBody>
+          <a:bodyPr anchor="b">
+            <a:normAutofit/>
+          </a:bodyPr>
+          <a:lstStyle/>
+          <a:p>
+            <a:r>
+              <a:rPr lang="en-US" sz="4800" dirty="0"/>
+              <a:t>Design Requirements Overview</a:t>
+            </a:r>
+          </a:p>
+        </p:txBody>
+      </p:sp>
+      <p:sp>
+        <p:nvSpPr>
+          <p:cNvPr id="12" name="Rectangle 11">
+            <a:extLst>
+              <a:ext uri="{FF2B5EF4-FFF2-40B4-BE49-F238E27FC236}">
+                <a16:creationId xmlns:a16="http://schemas.microsoft.com/office/drawing/2014/main" id="{3A9A4357-BD1D-4622-A4FE-766E6AB8DE84}"/>
+              </a:ext>
+              <a:ext uri="{C183D7F6-B498-43B3-948B-1728B52AA6E4}">
+                <adec:decorative xmlns:adec="http://schemas.microsoft.com/office/drawing/2017/decorative" val="1"/>
+              </a:ext>
+            </a:extLst>
+          </p:cNvPr>
+          <p:cNvSpPr>
+            <a:spLocks noGrp="1" noRot="1" noChangeAspect="1" noMove="1" noResize="1" noEditPoints="1" noAdjustHandles="1" noChangeArrowheads="1" noChangeShapeType="1" noTextEdit="1"/>
+          </p:cNvSpPr>
+          <p:nvPr>
+            <p:extLst>
+              <p:ext uri="{386F3935-93C4-4BCD-93E2-E3B085C9AB24}">
+                <p16:designElem xmlns:p16="http://schemas.microsoft.com/office/powerpoint/2015/main" val="1"/>
+              </p:ext>
+            </p:extLst>
+          </p:nvPr>
+        </p:nvSpPr>
+        <p:spPr>
+          <a:xfrm flipH="1" flipV="1">
+            <a:off x="-2" y="1998845"/>
+            <a:ext cx="11454595" cy="781699"/>
+          </a:xfrm>
+          <a:prstGeom prst="rect">
+            <a:avLst/>
+          </a:prstGeom>
+          <a:solidFill>
+            <a:schemeClr val="accent4"/>
+          </a:solidFill>
+          <a:ln>
+            <a:noFill/>
+          </a:ln>
+        </p:spPr>
+        <p:style>
+          <a:lnRef idx="2">
+            <a:schemeClr val="accent1">
+              <a:shade val="50000"/>
+            </a:schemeClr>
+          </a:lnRef>
+          <a:fillRef idx="1">
+            <a:schemeClr val="accent1"/>
+          </a:fillRef>
+          <a:effectRef idx="0">
+            <a:schemeClr val="accent1"/>
+          </a:effectRef>
+          <a:fontRef idx="minor">
+            <a:schemeClr val="lt1"/>
+          </a:fontRef>
+        </p:style>
+        <p:txBody>
+          <a:bodyPr rtlCol="0" anchor="ctr"/>
+          <a:lstStyle/>
+          <a:p>
+            <a:pPr algn="ctr"/>
+            <a:endParaRPr lang="en-US"/>
+          </a:p>
+        </p:txBody>
+      </p:sp>
+      <p:sp>
+        <p:nvSpPr>
+          <p:cNvPr id="14" name="Rectangle 13">
+            <a:extLst>
+              <a:ext uri="{FF2B5EF4-FFF2-40B4-BE49-F238E27FC236}">
+                <a16:creationId xmlns:a16="http://schemas.microsoft.com/office/drawing/2014/main" id="{E659831F-0D9A-4C63-9EBB-8435B85A440F}"/>
+              </a:ext>
+              <a:ext uri="{C183D7F6-B498-43B3-948B-1728B52AA6E4}">
+                <adec:decorative xmlns:adec="http://schemas.microsoft.com/office/drawing/2017/decorative" val="1"/>
+              </a:ext>
+            </a:extLst>
+          </p:cNvPr>
+          <p:cNvSpPr>
+            <a:spLocks noGrp="1" noRot="1" noChangeAspect="1" noMove="1" noResize="1" noEditPoints="1" noAdjustHandles="1" noChangeArrowheads="1" noChangeShapeType="1" noTextEdit="1"/>
+          </p:cNvSpPr>
+          <p:nvPr>
+            <p:extLst>
+              <p:ext uri="{386F3935-93C4-4BCD-93E2-E3B085C9AB24}">
+                <p16:designElem xmlns:p16="http://schemas.microsoft.com/office/powerpoint/2015/main" val="1"/>
+              </p:ext>
+            </p:extLst>
+          </p:nvPr>
+        </p:nvSpPr>
+        <p:spPr>
+          <a:xfrm>
+            <a:off x="0" y="2203079"/>
+            <a:ext cx="11383362" cy="4267991"/>
+          </a:xfrm>
+          <a:prstGeom prst="rect">
+            <a:avLst/>
+          </a:prstGeom>
+          <a:solidFill>
+            <a:schemeClr val="bg1"/>
+          </a:solidFill>
+          <a:ln>
+            <a:noFill/>
+          </a:ln>
+          <a:effectLst>
+            <a:outerShdw blurRad="139700" dist="127000" dir="5400000" algn="t" rotWithShape="0">
+              <a:prstClr val="black">
+                <a:alpha val="15000"/>
+              </a:prstClr>
+            </a:outerShdw>
+          </a:effectLst>
+        </p:spPr>
+        <p:style>
+          <a:lnRef idx="2">
+            <a:schemeClr val="accent1">
+              <a:shade val="50000"/>
+            </a:schemeClr>
+          </a:lnRef>
+          <a:fillRef idx="1">
+            <a:schemeClr val="accent1"/>
+          </a:fillRef>
+          <a:effectRef idx="0">
+            <a:schemeClr val="accent1"/>
+          </a:effectRef>
+          <a:fontRef idx="minor">
+            <a:schemeClr val="lt1"/>
+          </a:fontRef>
+        </p:style>
+        <p:txBody>
+          <a:bodyPr rtlCol="0" anchor="ctr"/>
+          <a:lstStyle/>
+          <a:p>
+            <a:pPr algn="ctr"/>
+            <a:endParaRPr lang="en-US"/>
+          </a:p>
+        </p:txBody>
+      </p:sp>
+      <p:sp>
+        <p:nvSpPr>
+          <p:cNvPr id="3" name="Content Placeholder 2">
+            <a:extLst>
+              <a:ext uri="{FF2B5EF4-FFF2-40B4-BE49-F238E27FC236}">
+                <a16:creationId xmlns:a16="http://schemas.microsoft.com/office/drawing/2014/main" id="{070E608B-1320-9410-96D6-756A6821624D}"/>
+              </a:ext>
+            </a:extLst>
+          </p:cNvPr>
+          <p:cNvSpPr>
+            <a:spLocks noGrp="1"/>
+          </p:cNvSpPr>
+          <p:nvPr>
+            <p:ph idx="1"/>
+          </p:nvPr>
+        </p:nvSpPr>
+        <p:spPr>
+          <a:xfrm>
+            <a:off x="793661" y="2599509"/>
+            <a:ext cx="4530898" cy="3639450"/>
+          </a:xfrm>
+        </p:spPr>
+        <p:txBody>
+          <a:bodyPr anchor="ctr">
+            <a:normAutofit/>
+          </a:bodyPr>
+          <a:lstStyle/>
+          <a:p>
+            <a:pPr marL="0" indent="0">
+              <a:buNone/>
+            </a:pPr>
+            <a:r>
+              <a:rPr lang="en-US" sz="1900"/>
+              <a:t>The project requirements have been documented into two parent categories: </a:t>
+            </a:r>
+          </a:p>
+          <a:p>
+            <a:endParaRPr lang="en-US" sz="1900"/>
+          </a:p>
+          <a:p>
+            <a:pPr marL="457200" lvl="1" indent="0">
+              <a:buNone/>
+            </a:pPr>
+            <a:r>
+              <a:rPr lang="en-US" sz="1900"/>
+              <a:t>1) </a:t>
+            </a:r>
+            <a:r>
+              <a:rPr lang="en-US" sz="1900" b="1"/>
+              <a:t>Subjective Technical Requirements </a:t>
+            </a:r>
+            <a:r>
+              <a:rPr lang="en-US" sz="1900"/>
+              <a:t>- requirements that are interpretation-based and describe a product’s requirements at a high level </a:t>
+            </a:r>
+          </a:p>
+          <a:p>
+            <a:pPr marL="457200" lvl="1" indent="0">
+              <a:buNone/>
+            </a:pPr>
+            <a:endParaRPr lang="en-US" sz="1900"/>
+          </a:p>
+          <a:p>
+            <a:pPr marL="457200" lvl="1" indent="0">
+              <a:buNone/>
+            </a:pPr>
+            <a:r>
+              <a:rPr lang="en-US" sz="1900"/>
+              <a:t>2) </a:t>
+            </a:r>
+            <a:r>
+              <a:rPr lang="en-US" sz="1900" b="1"/>
+              <a:t>Quantitative Requirements </a:t>
+            </a:r>
+            <a:r>
+              <a:rPr lang="en-US" sz="1900"/>
+              <a:t>– requirements that are countable, measurable, and are ascribed a numerical value for being met</a:t>
+            </a:r>
+          </a:p>
+        </p:txBody>
+      </p:sp>
+      <p:pic>
+        <p:nvPicPr>
+          <p:cNvPr id="5" name="Picture 4" descr="A diagram of a good requirements&#10;&#10;Description automatically generated with medium confidence">
+            <a:extLst>
+              <a:ext uri="{FF2B5EF4-FFF2-40B4-BE49-F238E27FC236}">
+                <a16:creationId xmlns:a16="http://schemas.microsoft.com/office/drawing/2014/main" id="{5E3E1130-5216-5841-F813-3244B2E8E562}"/>
+              </a:ext>
+            </a:extLst>
+          </p:cNvPr>
+          <p:cNvPicPr>
+            <a:picLocks noChangeAspect="1"/>
+          </p:cNvPicPr>
+          <p:nvPr/>
+        </p:nvPicPr>
+        <p:blipFill>
+          <a:blip r:embed="rId3"/>
+          <a:stretch>
+            <a:fillRect/>
+          </a:stretch>
+        </p:blipFill>
+        <p:spPr>
+          <a:xfrm>
+            <a:off x="5911532" y="2905737"/>
+            <a:ext cx="5150277" cy="2871279"/>
+          </a:xfrm>
+          <a:prstGeom prst="rect">
+            <a:avLst/>
+          </a:prstGeom>
+        </p:spPr>
+      </p:pic>
+      <p:sp>
+        <p:nvSpPr>
+          <p:cNvPr id="16" name="Rectangle 15">
+            <a:extLst>
+              <a:ext uri="{FF2B5EF4-FFF2-40B4-BE49-F238E27FC236}">
+                <a16:creationId xmlns:a16="http://schemas.microsoft.com/office/drawing/2014/main" id="{E6995CE5-F890-4ABA-82A2-26507CE8D2A3}"/>
+              </a:ext>
+              <a:ext uri="{C183D7F6-B498-43B3-948B-1728B52AA6E4}">
+                <adec:decorative xmlns:adec="http://schemas.microsoft.com/office/drawing/2017/decorative" val="1"/>
+              </a:ext>
+            </a:extLst>
+          </p:cNvPr>
+          <p:cNvSpPr>
+            <a:spLocks noGrp="1" noRot="1" noChangeAspect="1" noMove="1" noResize="1" noEditPoints="1" noAdjustHandles="1" noChangeArrowheads="1" noChangeShapeType="1" noTextEdit="1"/>
+          </p:cNvSpPr>
+          <p:nvPr>
+            <p:extLst>
+              <p:ext uri="{386F3935-93C4-4BCD-93E2-E3B085C9AB24}">
+                <p16:designElem xmlns:p16="http://schemas.microsoft.com/office/powerpoint/2015/main" val="1"/>
+              </p:ext>
+            </p:extLst>
+          </p:nvPr>
+        </p:nvSpPr>
+        <p:spPr>
+          <a:xfrm rot="5400000">
+            <a:off x="11228040" y="2313027"/>
+            <a:ext cx="781700" cy="152382"/>
+          </a:xfrm>
+          <a:prstGeom prst="rect">
+            <a:avLst/>
+          </a:prstGeom>
+          <a:solidFill>
+            <a:schemeClr val="accent4"/>
+          </a:solidFill>
+          <a:ln>
+            <a:noFill/>
+          </a:ln>
+        </p:spPr>
+        <p:style>
+          <a:lnRef idx="2">
+            <a:schemeClr val="accent1">
+              <a:shade val="50000"/>
+            </a:schemeClr>
+          </a:lnRef>
+          <a:fillRef idx="1">
+            <a:schemeClr val="accent1"/>
+          </a:fillRef>
+          <a:effectRef idx="0">
+            <a:schemeClr val="accent1"/>
+          </a:effectRef>
+          <a:fontRef idx="minor">
+            <a:schemeClr val="lt1"/>
+          </a:fontRef>
+        </p:style>
+        <p:txBody>
+          <a:bodyPr rtlCol="0" anchor="ctr"/>
+          <a:lstStyle/>
+          <a:p>
+            <a:pPr algn="ctr"/>
+            <a:endParaRPr lang="en-US"/>
+          </a:p>
+        </p:txBody>
+      </p:sp>
+      <p:pic>
+        <p:nvPicPr>
+          <p:cNvPr id="6" name="Picture 5" descr="A body of water with blue sky and clouds&#10;&#10;Description automatically generated with low confidence">
+            <a:extLst>
+              <a:ext uri="{FF2B5EF4-FFF2-40B4-BE49-F238E27FC236}">
+                <a16:creationId xmlns:a16="http://schemas.microsoft.com/office/drawing/2014/main" id="{7E5F0B8A-9D89-AEE7-6ABC-71EFF2F9C66E}"/>
+              </a:ext>
+            </a:extLst>
+          </p:cNvPr>
+          <p:cNvPicPr>
+            <a:picLocks noChangeAspect="1"/>
+          </p:cNvPicPr>
+          <p:nvPr/>
+        </p:nvPicPr>
+        <p:blipFill>
+          <a:blip r:embed="rId4">
+            <a:alphaModFix amt="20000"/>
+          </a:blip>
+          <a:stretch>
+            <a:fillRect/>
+          </a:stretch>
+        </p:blipFill>
+        <p:spPr>
+          <a:xfrm>
+            <a:off x="0" y="0"/>
+            <a:ext cx="12192000" cy="6857365"/>
+          </a:xfrm>
+          <a:prstGeom prst="rect">
+            <a:avLst/>
+          </a:prstGeom>
+        </p:spPr>
+      </p:pic>
+    </p:spTree>
+    <p:extLst>
+      <p:ext uri="{BB962C8B-B14F-4D97-AF65-F5344CB8AC3E}">
+        <p14:creationId xmlns:p14="http://schemas.microsoft.com/office/powerpoint/2010/main" val="3088504936"/>
+      </p:ext>
+    </p:extLst>
+  </p:cSld>
+  <p:clrMapOvr>
+    <a:masterClrMapping/>
+  </p:clrMapOvr>
+  <p:timing>
+    <p:tnLst>
+      <p:par>
+        <p:cTn id="1" dur="indefinite" restart="never" nodeType="tmRoot">
+          <p:childTnLst>
+            <p:seq concurrent="1" nextAc="seek">
+              <p:cTn id="2" dur="indefinite" nodeType="mainSeq">
+                <p:childTnLst>
+                  <p:par>
+                    <p:cTn id="3" fill="hold">
+                      <p:stCondLst>
+                        <p:cond delay="indefinite"/>
+                      </p:stCondLst>
+                      <p:childTnLst>
+                        <p:par>
+                          <p:cTn id="4" fill="hold">
+                            <p:stCondLst>
+                              <p:cond delay="0"/>
+                            </p:stCondLst>
+                            <p:childTnLst>
+                              <p:par>
+                                <p:cTn id="5" presetID="0" presetClass="path" presetSubtype="0" accel="50000" decel="50000" fill="hold" nodeType="clickEffect">
+                                  <p:stCondLst>
+                                    <p:cond delay="0"/>
+                                  </p:stCondLst>
+                                  <p:childTnLst>
+                                    <p:animMotion origin="layout" path="M 0 0 L -0.24922 -0.33656" pathEditMode="relative" ptsTypes="AA">
+                                      <p:cBhvr>
+                                        <p:cTn id="6" dur="30000" fill="hold"/>
+                                        <p:tgtEl>
+                                          <p:spTgt spid="6"/>
+                                        </p:tgtEl>
+                                        <p:attrNameLst>
+                                          <p:attrName>ppt_x</p:attrName>
+                                          <p:attrName>ppt_y</p:attrName>
+                                        </p:attrNameLst>
+                                      </p:cBhvr>
+                                    </p:animMotion>
+                                  </p:childTnLst>
+                                </p:cTn>
+                              </p:par>
+                              <p:par>
+                                <p:cTn id="7" presetID="6" presetClass="emph" presetSubtype="0" accel="50000" decel="50000" fill="hold" nodeType="withEffect">
+                                  <p:stCondLst>
+                                    <p:cond delay="0"/>
+                                  </p:stCondLst>
+                                  <p:childTnLst>
+                                    <p:animScale>
+                                      <p:cBhvr>
+                                        <p:cTn id="8" dur="30000" fill="hold"/>
+                                        <p:tgtEl>
+                                          <p:spTgt spid="6"/>
+                                        </p:tgtEl>
+                                      </p:cBhvr>
+                                      <p:by x="150000" y="150000"/>
+                                    </p:animScale>
+                                  </p:childTnLst>
+                                </p:cTn>
+                              </p:par>
+                            </p:childTnLst>
+                          </p:cTn>
+                        </p:par>
+                        <p:par>
+                          <p:cTn id="9" fill="hold">
+                            <p:stCondLst>
+                              <p:cond delay="30000"/>
+                            </p:stCondLst>
+                            <p:childTnLst>
+                              <p:par>
+                                <p:cTn id="10" presetID="0" presetClass="path" presetSubtype="0" accel="50000" decel="50000" fill="hold" nodeType="afterEffect">
+                                  <p:stCondLst>
+                                    <p:cond delay="5000"/>
+                                  </p:stCondLst>
+                                  <p:childTnLst>
+                                    <p:animMotion origin="layout" path="M -0.24922 -0.33656 L 0.24922 0.38839" pathEditMode="relative" ptsTypes="AA">
+                                      <p:cBhvr>
+                                        <p:cTn id="11" dur="30000" fill="hold"/>
+                                        <p:tgtEl>
+                                          <p:spTgt spid="6"/>
+                                        </p:tgtEl>
+                                        <p:attrNameLst>
+                                          <p:attrName>ppt_x</p:attrName>
+                                          <p:attrName>ppt_y</p:attrName>
+                                        </p:attrNameLst>
+                                      </p:cBhvr>
+                                    </p:animMotion>
+                                  </p:childTnLst>
+                                </p:cTn>
+                              </p:par>
+                            </p:childTnLst>
+                          </p:cTn>
+                        </p:par>
+                        <p:par>
+                          <p:cTn id="12" fill="hold">
+                            <p:stCondLst>
+                              <p:cond delay="65000"/>
+                            </p:stCondLst>
+                            <p:childTnLst>
+                              <p:par>
+                                <p:cTn id="13" presetID="0" presetClass="path" presetSubtype="0" accel="50000" decel="50000" fill="hold" nodeType="afterEffect">
+                                  <p:stCondLst>
+                                    <p:cond delay="5000"/>
+                                  </p:stCondLst>
+                                  <p:childTnLst>
+                                    <p:animMotion origin="layout" path="M 0.24922 0.38839 L -0.23513 0.38839" pathEditMode="relative" ptsTypes="AA">
+                                      <p:cBhvr>
+                                        <p:cTn id="14" dur="30000" fill="hold"/>
+                                        <p:tgtEl>
+                                          <p:spTgt spid="6"/>
+                                        </p:tgtEl>
+                                        <p:attrNameLst>
+                                          <p:attrName>ppt_x</p:attrName>
+                                          <p:attrName>ppt_y</p:attrName>
+                                        </p:attrNameLst>
+                                      </p:cBhvr>
+                                    </p:animMotion>
+                                  </p:childTnLst>
+                                </p:cTn>
+                              </p:par>
+                            </p:childTnLst>
+                          </p:cTn>
+                        </p:par>
+                        <p:par>
+                          <p:cTn id="15" fill="hold">
+                            <p:stCondLst>
+                              <p:cond delay="100000"/>
+                            </p:stCondLst>
+                            <p:childTnLst>
+                              <p:par>
+                                <p:cTn id="16" presetID="0" presetClass="path" presetSubtype="0" accel="50000" decel="50000" fill="hold" nodeType="afterEffect">
+                                  <p:stCondLst>
+                                    <p:cond delay="5000"/>
+                                  </p:stCondLst>
+                                  <p:childTnLst>
+                                    <p:animMotion origin="layout" path="M -0.23513 0.38839 L 0.24922 -0.38839" pathEditMode="relative" ptsTypes="AA">
+                                      <p:cBhvr>
+                                        <p:cTn id="17" dur="30000" fill="hold"/>
+                                        <p:tgtEl>
+                                          <p:spTgt spid="6"/>
+                                        </p:tgtEl>
+                                        <p:attrNameLst>
+                                          <p:attrName>ppt_x</p:attrName>
+                                          <p:attrName>ppt_y</p:attrName>
+                                        </p:attrNameLst>
+                                      </p:cBhvr>
+                                    </p:animMotion>
+                                  </p:childTnLst>
+                                </p:cTn>
+                              </p:par>
+                            </p:childTnLst>
+                          </p:cTn>
+                        </p:par>
+                        <p:par>
+                          <p:cTn id="18" fill="hold">
+                            <p:stCondLst>
+                              <p:cond delay="135000"/>
+                            </p:stCondLst>
+                            <p:childTnLst>
+                              <p:par>
+                                <p:cTn id="19" presetID="0" presetClass="path" presetSubtype="0" accel="50000" decel="50000" fill="hold" nodeType="afterEffect">
+                                  <p:stCondLst>
+                                    <p:cond delay="5000"/>
+                                  </p:stCondLst>
+                                  <p:childTnLst>
+                                    <p:animMotion origin="layout" path="M 0.24922 -0.38839 L -0.24922 -0.38839" pathEditMode="relative" ptsTypes="AA">
+                                      <p:cBhvr>
+                                        <p:cTn id="20" dur="30000" fill="hold"/>
+                                        <p:tgtEl>
+                                          <p:spTgt spid="6"/>
+                                        </p:tgtEl>
+                                        <p:attrNameLst>
+                                          <p:attrName>ppt_x</p:attrName>
+                                          <p:attrName>ppt_y</p:attrName>
+                                        </p:attrNameLst>
+                                      </p:cBhvr>
+                                    </p:animMotion>
+                                  </p:childTnLst>
+                                </p:cTn>
+                              </p:par>
+                            </p:childTnLst>
+                          </p:cTn>
+                        </p:par>
+                        <p:par>
+                          <p:cTn id="21" fill="hold">
+                            <p:stCondLst>
+                              <p:cond delay="170000"/>
+                            </p:stCondLst>
+                            <p:childTnLst>
+                              <p:par>
+                                <p:cTn id="22" presetID="0" presetClass="path" presetSubtype="0" accel="50000" decel="50000" fill="hold" nodeType="afterEffect">
+                                  <p:stCondLst>
+                                    <p:cond delay="5000"/>
+                                  </p:stCondLst>
+                                  <p:childTnLst>
+                                    <p:animMotion origin="layout" path="M -0.24922 -0.38839 L 0 0" pathEditMode="relative" ptsTypes="AA">
+                                      <p:cBhvr>
+                                        <p:cTn id="23" dur="30000" fill="hold"/>
+                                        <p:tgtEl>
+                                          <p:spTgt spid="6"/>
+                                        </p:tgtEl>
+                                        <p:attrNameLst>
+                                          <p:attrName>ppt_x</p:attrName>
+                                          <p:attrName>ppt_y</p:attrName>
+                                        </p:attrNameLst>
+                                      </p:cBhvr>
+                                    </p:animMotion>
+                                  </p:childTnLst>
+                                </p:cTn>
+                              </p:par>
+                              <p:par>
+                                <p:cTn id="24" presetID="6" presetClass="emph" presetSubtype="0" accel="50000" decel="50000" fill="hold" nodeType="withEffect">
+                                  <p:stCondLst>
+                                    <p:cond delay="5000"/>
+                                  </p:stCondLst>
+                                  <p:childTnLst>
+                                    <p:animScale>
+                                      <p:cBhvr>
+                                        <p:cTn id="25" dur="30000" fill="hold"/>
+                                        <p:tgtEl>
+                                          <p:spTgt spid="6"/>
+                                        </p:tgtEl>
+                                      </p:cBhvr>
+                                      <p:by x="150000" y="150000"/>
+                                      <p:to x="100000" y="100000"/>
+                                    </p:animScale>
+                                  </p:childTnLst>
+                                </p:cTn>
+                              </p:par>
+                            </p:childTnLst>
+                          </p:cTn>
+                        </p:par>
+                        <p:par>
+                          <p:cTn id="26" fill="hold">
+                            <p:stCondLst>
+                              <p:cond delay="205000"/>
+                            </p:stCondLst>
+                            <p:childTnLst>
+                              <p:par>
+                                <p:cTn id="27" presetID="0" presetClass="path" presetSubtype="0" accel="50000" decel="50000" fill="hold" nodeType="afterEffect">
+                                  <p:stCondLst>
+                                    <p:cond delay="0"/>
+                                  </p:stCondLst>
+                                  <p:childTnLst>
+                                    <p:animMotion origin="layout" path="M 0 0 L 0 0" pathEditMode="relative" ptsTypes="AA">
+                                      <p:cBhvr>
+                                        <p:cTn id="28" dur="5000" fill="hold"/>
+                                        <p:tgtEl>
+                                          <p:spTgt spid="6"/>
+                                        </p:tgtEl>
+                                        <p:attrNameLst>
+                                          <p:attrName>ppt_x</p:attrName>
+                                          <p:attrName>ppt_y</p:attrName>
+                                        </p:attrNameLst>
+                                      </p:cBhvr>
+                                    </p:animMotion>
+                                  </p:childTnLst>
+                                </p:cTn>
+                              </p:par>
+                            </p:childTnLst>
+                          </p:cTn>
+                        </p:par>
+                      </p:childTnLst>
+                    </p:cTn>
+                  </p:par>
+                </p:childTnLst>
+              </p:cTn>
+              <p:prevCondLst>
+                <p:cond evt="onPrev" delay="0">
+                  <p:tgtEl>
+                    <p:sldTgt/>
+                  </p:tgtEl>
+                </p:cond>
+              </p:prevCondLst>
+              <p:nextCondLst>
+                <p:cond evt="onNext" delay="0">
+                  <p:tgtEl>
+                    <p:sldTgt/>
+                  </p:tgtEl>
+                </p:cond>
+              </p:nextCondLst>
+            </p:seq>
+          </p:childTnLst>
+        </p:cTn>
+      </p:par>
+    </p:tnLst>
+  </p:timing>
+</p:sld>
+</file>
+
+<file path=ppt/slides/slide6.xml><?xml version="1.0" encoding="utf-8"?>
+<p:sld xmlns:a="http://schemas.openxmlformats.org/drawingml/2006/main" xmlns:r="http://schemas.openxmlformats.org/officeDocument/2006/relationships" xmlns:p="http://schemas.openxmlformats.org/presentationml/2006/main">
+  <p:cSld>
+    <p:spTree>
+      <p:nvGrpSpPr>
+        <p:cNvPr id="1" name=""/>
+        <p:cNvGrpSpPr/>
+        <p:nvPr/>
+      </p:nvGrpSpPr>
+      <p:grpSpPr>
+        <a:xfrm>
+          <a:off x="0" y="0"/>
+          <a:ext cx="0" cy="0"/>
+          <a:chOff x="0" y="0"/>
+          <a:chExt cx="0" cy="0"/>
+        </a:xfrm>
+      </p:grpSpPr>
+      <p:sp>
+        <p:nvSpPr>
+          <p:cNvPr id="2" name="Title 1">
+            <a:extLst>
+              <a:ext uri="{FF2B5EF4-FFF2-40B4-BE49-F238E27FC236}">
+                <a16:creationId xmlns:a16="http://schemas.microsoft.com/office/drawing/2014/main" id="{394BB85F-5702-2F0B-9F32-1C3991C62473}"/>
+              </a:ext>
+            </a:extLst>
+          </p:cNvPr>
+          <p:cNvSpPr>
+            <a:spLocks noGrp="1"/>
+          </p:cNvSpPr>
+          <p:nvPr>
+            <p:ph type="title"/>
+          </p:nvPr>
+        </p:nvSpPr>
+        <p:spPr>
+          <a:xfrm>
+            <a:off x="838200" y="18255"/>
+            <a:ext cx="10515600" cy="1325563"/>
+          </a:xfrm>
+        </p:spPr>
+        <p:txBody>
+          <a:bodyPr/>
+          <a:lstStyle/>
+          <a:p>
+            <a:r>
+              <a:rPr lang="en-US" dirty="0"/>
+              <a:t>System Design Requirements </a:t>
+            </a:r>
+          </a:p>
+        </p:txBody>
+      </p:sp>
+      <p:sp>
+        <p:nvSpPr>
+          <p:cNvPr id="3" name="Content Placeholder 2">
+            <a:extLst>
+              <a:ext uri="{FF2B5EF4-FFF2-40B4-BE49-F238E27FC236}">
+                <a16:creationId xmlns:a16="http://schemas.microsoft.com/office/drawing/2014/main" id="{E8CE9114-6A69-70ED-B5CB-4401DB561D68}"/>
+              </a:ext>
+            </a:extLst>
+          </p:cNvPr>
+          <p:cNvSpPr>
+            <a:spLocks noGrp="1"/>
+          </p:cNvSpPr>
+          <p:nvPr>
+            <p:ph idx="1"/>
+          </p:nvPr>
+        </p:nvSpPr>
+        <p:spPr>
+          <a:xfrm>
+            <a:off x="0" y="1155940"/>
+            <a:ext cx="12192000" cy="5683805"/>
+          </a:xfrm>
+        </p:spPr>
+        <p:txBody>
+          <a:bodyPr>
+            <a:normAutofit/>
+          </a:bodyPr>
+          <a:lstStyle/>
+          <a:p>
+            <a:r>
+              <a:rPr lang="en-US" dirty="0"/>
+              <a:t>The design requirements in the project will be documented according to the system in which they are incorporated:</a:t>
+            </a:r>
+          </a:p>
+          <a:p>
+            <a:pPr marL="0" indent="0">
+              <a:buNone/>
+            </a:pPr>
+            <a:endParaRPr lang="en-US" dirty="0"/>
+          </a:p>
+          <a:p>
+            <a:pPr marL="0" indent="0">
+              <a:buNone/>
+            </a:pPr>
+            <a:r>
+              <a:rPr lang="en-US" dirty="0"/>
+              <a:t>	1) </a:t>
+            </a:r>
+            <a:r>
+              <a:rPr lang="en-US" b="1" dirty="0"/>
+              <a:t>Containerization Technology System </a:t>
+            </a:r>
+            <a:r>
+              <a:rPr lang="en-US" dirty="0"/>
+              <a:t>– refers to the open-source containerization platform in which the containers will be 	built, tested, and deployed </a:t>
+            </a:r>
+          </a:p>
+          <a:p>
+            <a:pPr marL="0" indent="0">
+              <a:buNone/>
+            </a:pPr>
+            <a:r>
+              <a:rPr lang="en-US" dirty="0"/>
+              <a:t>	2) </a:t>
+            </a:r>
+            <a:r>
+              <a:rPr lang="en-US" b="1" dirty="0"/>
+              <a:t>Container Orchestration System </a:t>
+            </a:r>
+            <a:r>
+              <a:rPr lang="en-US" dirty="0"/>
+              <a:t>– system in which containers, databases, and other services are developed to communicate in a load-balanced, distributed system</a:t>
+            </a:r>
+          </a:p>
+          <a:p>
+            <a:pPr marL="0" indent="0">
+              <a:buNone/>
+            </a:pPr>
+            <a:r>
+              <a:rPr lang="en-US" dirty="0"/>
+              <a:t>	3) </a:t>
+            </a:r>
+            <a:r>
+              <a:rPr lang="en-US" b="1" dirty="0"/>
+              <a:t>Containerization Software Stack </a:t>
+            </a:r>
+            <a:r>
+              <a:rPr lang="en-US" dirty="0"/>
+              <a:t>– software stack from which the containers, their source code, microservices and the communication between them will be built </a:t>
+            </a:r>
+          </a:p>
+        </p:txBody>
+      </p:sp>
+      <p:pic>
+        <p:nvPicPr>
+          <p:cNvPr id="4" name="Picture 3" descr="A body of water with blue sky and clouds&#10;&#10;Description automatically generated with low confidence">
+            <a:extLst>
+              <a:ext uri="{FF2B5EF4-FFF2-40B4-BE49-F238E27FC236}">
+                <a16:creationId xmlns:a16="http://schemas.microsoft.com/office/drawing/2014/main" id="{161AE6B8-5862-4DC9-D9D7-778C1065A93F}"/>
+              </a:ext>
+            </a:extLst>
+          </p:cNvPr>
+          <p:cNvPicPr>
+            <a:picLocks noChangeAspect="1"/>
+          </p:cNvPicPr>
+          <p:nvPr/>
+        </p:nvPicPr>
+        <p:blipFill>
+          <a:blip r:embed="rId3">
+            <a:alphaModFix amt="20000"/>
+          </a:blip>
+          <a:stretch>
+            <a:fillRect/>
+          </a:stretch>
+        </p:blipFill>
+        <p:spPr>
+          <a:xfrm>
+            <a:off x="0" y="-17620"/>
+            <a:ext cx="12192000" cy="6857365"/>
+          </a:xfrm>
+          <a:prstGeom prst="rect">
+            <a:avLst/>
+          </a:prstGeom>
+        </p:spPr>
+      </p:pic>
+    </p:spTree>
+    <p:extLst>
+      <p:ext uri="{BB962C8B-B14F-4D97-AF65-F5344CB8AC3E}">
+        <p14:creationId xmlns:p14="http://schemas.microsoft.com/office/powerpoint/2010/main" val="437950919"/>
+      </p:ext>
+    </p:extLst>
+  </p:cSld>
+  <p:clrMapOvr>
+    <a:masterClrMapping/>
+  </p:clrMapOvr>
+  <p:timing>
+    <p:tnLst>
+      <p:par>
+        <p:cTn id="1" dur="indefinite" restart="never" nodeType="tmRoot">
+          <p:childTnLst>
+            <p:seq concurrent="1" nextAc="seek">
+              <p:cTn id="2" dur="indefinite" nodeType="mainSeq">
+                <p:childTnLst>
+                  <p:par>
+                    <p:cTn id="3" fill="hold">
+                      <p:stCondLst>
+                        <p:cond delay="indefinite"/>
+                      </p:stCondLst>
+                      <p:childTnLst>
+                        <p:par>
+                          <p:cTn id="4" fill="hold">
+                            <p:stCondLst>
+                              <p:cond delay="0"/>
+                            </p:stCondLst>
+                            <p:childTnLst>
+                              <p:par>
+                                <p:cTn id="5" presetID="0" presetClass="path" presetSubtype="0" accel="50000" decel="50000" fill="hold" nodeType="clickEffect">
+                                  <p:stCondLst>
+                                    <p:cond delay="0"/>
+                                  </p:stCondLst>
+                                  <p:childTnLst>
+                                    <p:animMotion origin="layout" path="M 0 0 L -0.24922 -0.33656" pathEditMode="relative" ptsTypes="AA">
+                                      <p:cBhvr>
+                                        <p:cTn id="6" dur="30000" fill="hold"/>
+                                        <p:tgtEl>
+                                          <p:spTgt spid="4"/>
+                                        </p:tgtEl>
+                                        <p:attrNameLst>
+                                          <p:attrName>ppt_x</p:attrName>
+                                          <p:attrName>ppt_y</p:attrName>
+                                        </p:attrNameLst>
+                                      </p:cBhvr>
+                                    </p:animMotion>
+                                  </p:childTnLst>
+                                </p:cTn>
+                              </p:par>
+                              <p:par>
+                                <p:cTn id="7" presetID="6" presetClass="emph" presetSubtype="0" accel="50000" decel="50000" fill="hold" nodeType="withEffect">
+                                  <p:stCondLst>
+                                    <p:cond delay="0"/>
+                                  </p:stCondLst>
+                                  <p:childTnLst>
+                                    <p:animScale>
+                                      <p:cBhvr>
+                                        <p:cTn id="8" dur="30000" fill="hold"/>
+                                        <p:tgtEl>
+                                          <p:spTgt spid="4"/>
+                                        </p:tgtEl>
+                                      </p:cBhvr>
+                                      <p:by x="150000" y="150000"/>
+                                    </p:animScale>
+                                  </p:childTnLst>
+                                </p:cTn>
+                              </p:par>
+                            </p:childTnLst>
+                          </p:cTn>
+                        </p:par>
+                        <p:par>
+                          <p:cTn id="9" fill="hold">
+                            <p:stCondLst>
+                              <p:cond delay="30000"/>
+                            </p:stCondLst>
+                            <p:childTnLst>
+                              <p:par>
+                                <p:cTn id="10" presetID="0" presetClass="path" presetSubtype="0" accel="50000" decel="50000" fill="hold" nodeType="afterEffect">
+                                  <p:stCondLst>
+                                    <p:cond delay="5000"/>
+                                  </p:stCondLst>
+                                  <p:childTnLst>
+                                    <p:animMotion origin="layout" path="M -0.24922 -0.33656 L 0.24922 0.38839" pathEditMode="relative" ptsTypes="AA">
+                                      <p:cBhvr>
+                                        <p:cTn id="11" dur="30000" fill="hold"/>
+                                        <p:tgtEl>
+                                          <p:spTgt spid="4"/>
+                                        </p:tgtEl>
+                                        <p:attrNameLst>
+                                          <p:attrName>ppt_x</p:attrName>
+                                          <p:attrName>ppt_y</p:attrName>
+                                        </p:attrNameLst>
+                                      </p:cBhvr>
+                                    </p:animMotion>
+                                  </p:childTnLst>
+                                </p:cTn>
+                              </p:par>
+                            </p:childTnLst>
+                          </p:cTn>
+                        </p:par>
+                        <p:par>
+                          <p:cTn id="12" fill="hold">
+                            <p:stCondLst>
+                              <p:cond delay="65000"/>
+                            </p:stCondLst>
+                            <p:childTnLst>
+                              <p:par>
+                                <p:cTn id="13" presetID="0" presetClass="path" presetSubtype="0" accel="50000" decel="50000" fill="hold" nodeType="afterEffect">
+                                  <p:stCondLst>
+                                    <p:cond delay="5000"/>
+                                  </p:stCondLst>
+                                  <p:childTnLst>
+                                    <p:animMotion origin="layout" path="M 0.24922 0.38839 L -0.23513 0.38839" pathEditMode="relative" ptsTypes="AA">
+                                      <p:cBhvr>
+                                        <p:cTn id="14" dur="30000" fill="hold"/>
+                                        <p:tgtEl>
+                                          <p:spTgt spid="4"/>
+                                        </p:tgtEl>
+                                        <p:attrNameLst>
+                                          <p:attrName>ppt_x</p:attrName>
+                                          <p:attrName>ppt_y</p:attrName>
+                                        </p:attrNameLst>
+                                      </p:cBhvr>
+                                    </p:animMotion>
+                                  </p:childTnLst>
+                                </p:cTn>
+                              </p:par>
+                            </p:childTnLst>
+                          </p:cTn>
+                        </p:par>
+                        <p:par>
+                          <p:cTn id="15" fill="hold">
+                            <p:stCondLst>
+                              <p:cond delay="100000"/>
+                            </p:stCondLst>
+                            <p:childTnLst>
+                              <p:par>
+                                <p:cTn id="16" presetID="0" presetClass="path" presetSubtype="0" accel="50000" decel="50000" fill="hold" nodeType="afterEffect">
+                                  <p:stCondLst>
+                                    <p:cond delay="5000"/>
+                                  </p:stCondLst>
+                                  <p:childTnLst>
+                                    <p:animMotion origin="layout" path="M -0.23513 0.38839 L 0.24922 -0.38839" pathEditMode="relative" ptsTypes="AA">
+                                      <p:cBhvr>
+                                        <p:cTn id="17" dur="30000" fill="hold"/>
+                                        <p:tgtEl>
+                                          <p:spTgt spid="4"/>
+                                        </p:tgtEl>
+                                        <p:attrNameLst>
+                                          <p:attrName>ppt_x</p:attrName>
+                                          <p:attrName>ppt_y</p:attrName>
+                                        </p:attrNameLst>
+                                      </p:cBhvr>
+                                    </p:animMotion>
+                                  </p:childTnLst>
+                                </p:cTn>
+                              </p:par>
+                            </p:childTnLst>
+                          </p:cTn>
+                        </p:par>
+                        <p:par>
+                          <p:cTn id="18" fill="hold">
+                            <p:stCondLst>
+                              <p:cond delay="135000"/>
+                            </p:stCondLst>
+                            <p:childTnLst>
+                              <p:par>
+                                <p:cTn id="19" presetID="0" presetClass="path" presetSubtype="0" accel="50000" decel="50000" fill="hold" nodeType="afterEffect">
+                                  <p:stCondLst>
+                                    <p:cond delay="5000"/>
+                                  </p:stCondLst>
+                                  <p:childTnLst>
+                                    <p:animMotion origin="layout" path="M 0.24922 -0.38839 L -0.24922 -0.38839" pathEditMode="relative" ptsTypes="AA">
+                                      <p:cBhvr>
+                                        <p:cTn id="20" dur="30000" fill="hold"/>
+                                        <p:tgtEl>
+                                          <p:spTgt spid="4"/>
+                                        </p:tgtEl>
+                                        <p:attrNameLst>
+                                          <p:attrName>ppt_x</p:attrName>
+                                          <p:attrName>ppt_y</p:attrName>
+                                        </p:attrNameLst>
+                                      </p:cBhvr>
+                                    </p:animMotion>
+                                  </p:childTnLst>
+                                </p:cTn>
+                              </p:par>
+                            </p:childTnLst>
+                          </p:cTn>
+                        </p:par>
+                        <p:par>
+                          <p:cTn id="21" fill="hold">
+                            <p:stCondLst>
+                              <p:cond delay="170000"/>
+                            </p:stCondLst>
+                            <p:childTnLst>
+                              <p:par>
+                                <p:cTn id="22" presetID="0" presetClass="path" presetSubtype="0" accel="50000" decel="50000" fill="hold" nodeType="afterEffect">
+                                  <p:stCondLst>
+                                    <p:cond delay="5000"/>
+                                  </p:stCondLst>
+                                  <p:childTnLst>
+                                    <p:animMotion origin="layout" path="M -0.24922 -0.38839 L 0 0" pathEditMode="relative" ptsTypes="AA">
+                                      <p:cBhvr>
+                                        <p:cTn id="23" dur="30000" fill="hold"/>
+                                        <p:tgtEl>
+                                          <p:spTgt spid="4"/>
+                                        </p:tgtEl>
+                                        <p:attrNameLst>
+                                          <p:attrName>ppt_x</p:attrName>
+                                          <p:attrName>ppt_y</p:attrName>
+                                        </p:attrNameLst>
+                                      </p:cBhvr>
+                                    </p:animMotion>
+                                  </p:childTnLst>
+                                </p:cTn>
+                              </p:par>
+                              <p:par>
+                                <p:cTn id="24" presetID="6" presetClass="emph" presetSubtype="0" accel="50000" decel="50000" fill="hold" nodeType="withEffect">
+                                  <p:stCondLst>
+                                    <p:cond delay="5000"/>
+                                  </p:stCondLst>
+                                  <p:childTnLst>
+                                    <p:animScale>
+                                      <p:cBhvr>
+                                        <p:cTn id="25" dur="30000" fill="hold"/>
+                                        <p:tgtEl>
+                                          <p:spTgt spid="4"/>
+                                        </p:tgtEl>
+                                      </p:cBhvr>
+                                      <p:by x="150000" y="150000"/>
+                                      <p:to x="100000" y="100000"/>
+                                    </p:animScale>
+                                  </p:childTnLst>
+                                </p:cTn>
+                              </p:par>
+                            </p:childTnLst>
+                          </p:cTn>
+                        </p:par>
+                        <p:par>
+                          <p:cTn id="26" fill="hold">
+                            <p:stCondLst>
+                              <p:cond delay="205000"/>
+                            </p:stCondLst>
+                            <p:childTnLst>
+                              <p:par>
+                                <p:cTn id="27" presetID="0" presetClass="path" presetSubtype="0" accel="50000" decel="50000" fill="hold" nodeType="afterEffect">
+                                  <p:stCondLst>
+                                    <p:cond delay="0"/>
+                                  </p:stCondLst>
+                                  <p:childTnLst>
+                                    <p:animMotion origin="layout" path="M 0 0 L 0 0" pathEditMode="relative" ptsTypes="AA">
+                                      <p:cBhvr>
+                                        <p:cTn id="28" dur="5000" fill="hold"/>
+                                        <p:tgtEl>
+                                          <p:spTgt spid="4"/>
+                                        </p:tgtEl>
+                                        <p:attrNameLst>
+                                          <p:attrName>ppt_x</p:attrName>
+                                          <p:attrName>ppt_y</p:attrName>
+                                        </p:attrNameLst>
+                                      </p:cBhvr>
+                                    </p:animMotion>
+                                  </p:childTnLst>
+                                </p:cTn>
+                              </p:par>
+                            </p:childTnLst>
+                          </p:cTn>
+                        </p:par>
+                      </p:childTnLst>
+                    </p:cTn>
+                  </p:par>
+                </p:childTnLst>
+              </p:cTn>
+              <p:prevCondLst>
+                <p:cond evt="onPrev" delay="0">
+                  <p:tgtEl>
+                    <p:sldTgt/>
+                  </p:tgtEl>
+                </p:cond>
+              </p:prevCondLst>
+              <p:nextCondLst>
+                <p:cond evt="onNext" delay="0">
+                  <p:tgtEl>
+                    <p:sldTgt/>
+                  </p:tgtEl>
+                </p:cond>
+              </p:nextCondLst>
+            </p:seq>
+          </p:childTnLst>
+        </p:cTn>
+      </p:par>
+    </p:tnLst>
+  </p:timing>
+</p:sld>
+</file>
+
+<file path=ppt/slides/slide7.xml><?xml version="1.0" encoding="utf-8"?>
+<p:sld xmlns:a="http://schemas.openxmlformats.org/drawingml/2006/main" xmlns:r="http://schemas.openxmlformats.org/officeDocument/2006/relationships" xmlns:p="http://schemas.openxmlformats.org/presentationml/2006/main">
+  <p:cSld>
+    <p:bg>
+      <p:bgPr>
+        <a:solidFill>
+          <a:schemeClr val="bg1"/>
+        </a:solidFill>
+        <a:effectLst/>
+      </p:bgPr>
+    </p:bg>
+    <p:spTree>
+      <p:nvGrpSpPr>
+        <p:cNvPr id="1" name=""/>
+        <p:cNvGrpSpPr/>
+        <p:nvPr/>
+      </p:nvGrpSpPr>
+      <p:grpSpPr>
+        <a:xfrm>
+          <a:off x="0" y="0"/>
+          <a:ext cx="0" cy="0"/>
+          <a:chOff x="0" y="0"/>
+          <a:chExt cx="0" cy="0"/>
+        </a:xfrm>
+      </p:grpSpPr>
       <p:sp>
         <p:nvSpPr>
           <p:cNvPr id="14" name="Down Arrow 7">
@@ -6986,7 +8488,7 @@
           <a:p>
             <a:pPr algn="ctr"/>
             <a:r>
-              <a:rPr lang="en-US" sz="3300" kern="1200">
+              <a:rPr lang="en-US" sz="3300" kern="1200" dirty="0">
                 <a:solidFill>
                   <a:srgbClr val="FFFFFF"/>
                 </a:solidFill>
@@ -6994,7 +8496,7 @@
                 <a:ea typeface="+mj-ea"/>
                 <a:cs typeface="+mj-cs"/>
               </a:rPr>
-              <a:t>Product Design: CRIOS Environment Release</a:t>
+              <a:t>Product Design: SMART Goal Release</a:t>
             </a:r>
           </a:p>
         </p:txBody>
@@ -7044,7 +8546,7 @@
 </p:sld>
 </file>
 
-<file path=ppt/slides/slide6.xml><?xml version="1.0" encoding="utf-8"?>
+<file path=ppt/slides/slide8.xml><?xml version="1.0" encoding="utf-8"?>
 <p:sld xmlns:a="http://schemas.openxmlformats.org/drawingml/2006/main" xmlns:r="http://schemas.openxmlformats.org/officeDocument/2006/relationships" xmlns:p="http://schemas.openxmlformats.org/presentationml/2006/main">
   <p:cSld>
     <p:bg>
@@ -7174,29 +8676,7 @@
                 <a:ea typeface="+mj-ea"/>
                 <a:cs typeface="+mj-cs"/>
               </a:rPr>
-              <a:t>Product Design: </a:t>
-            </a:r>
-            <a:r>
-              <a:rPr lang="en-US" sz="3300" kern="1200" dirty="0" err="1">
-                <a:solidFill>
-                  <a:srgbClr val="FFFFFF"/>
-                </a:solidFill>
-                <a:latin typeface="+mj-lt"/>
-                <a:ea typeface="+mj-ea"/>
-                <a:cs typeface="+mj-cs"/>
-              </a:rPr>
-              <a:t>MITgcm</a:t>
-            </a:r>
-            <a:r>
-              <a:rPr lang="en-US" sz="3300" kern="1200" dirty="0">
-                <a:solidFill>
-                  <a:srgbClr val="FFFFFF"/>
-                </a:solidFill>
-                <a:latin typeface="+mj-lt"/>
-                <a:ea typeface="+mj-ea"/>
-                <a:cs typeface="+mj-cs"/>
-              </a:rPr>
-              <a:t>-ECCO Community Release</a:t>
+              <a:t>Product Design: Stretch Goal Release</a:t>
             </a:r>
           </a:p>
         </p:txBody>
@@ -7313,179 +8793,6 @@
     <p:extLst>
       <p:ext uri="{BB962C8B-B14F-4D97-AF65-F5344CB8AC3E}">
         <p14:creationId xmlns:p14="http://schemas.microsoft.com/office/powerpoint/2010/main" val="3410433451"/>
-      </p:ext>
-    </p:extLst>
-  </p:cSld>
-  <p:clrMapOvr>
-    <a:masterClrMapping/>
-  </p:clrMapOvr>
-</p:sld>
-</file>
-
-<file path=ppt/slides/slide7.xml><?xml version="1.0" encoding="utf-8"?>
-<p:sld xmlns:a="http://schemas.openxmlformats.org/drawingml/2006/main" xmlns:r="http://schemas.openxmlformats.org/officeDocument/2006/relationships" xmlns:p="http://schemas.openxmlformats.org/presentationml/2006/main">
-  <p:cSld>
-    <p:spTree>
-      <p:nvGrpSpPr>
-        <p:cNvPr id="1" name=""/>
-        <p:cNvGrpSpPr/>
-        <p:nvPr/>
-      </p:nvGrpSpPr>
-      <p:grpSpPr>
-        <a:xfrm>
-          <a:off x="0" y="0"/>
-          <a:ext cx="0" cy="0"/>
-          <a:chOff x="0" y="0"/>
-          <a:chExt cx="0" cy="0"/>
-        </a:xfrm>
-      </p:grpSpPr>
-      <p:sp>
-        <p:nvSpPr>
-          <p:cNvPr id="2" name="Title 1">
-            <a:extLst>
-              <a:ext uri="{FF2B5EF4-FFF2-40B4-BE49-F238E27FC236}">
-                <a16:creationId xmlns:a16="http://schemas.microsoft.com/office/drawing/2014/main" id="{02636810-ED92-A3E3-857C-A79962CB2A37}"/>
-              </a:ext>
-            </a:extLst>
-          </p:cNvPr>
-          <p:cNvSpPr>
-            <a:spLocks noGrp="1"/>
-          </p:cNvSpPr>
-          <p:nvPr>
-            <p:ph type="title"/>
-          </p:nvPr>
-        </p:nvSpPr>
-        <p:spPr/>
-        <p:txBody>
-          <a:bodyPr/>
-          <a:lstStyle/>
-          <a:p>
-            <a:r>
-              <a:rPr lang="en-US" dirty="0"/>
-              <a:t>System #1 Design</a:t>
-            </a:r>
-          </a:p>
-        </p:txBody>
-      </p:sp>
-      <p:sp>
-        <p:nvSpPr>
-          <p:cNvPr id="3" name="Content Placeholder 2">
-            <a:extLst>
-              <a:ext uri="{FF2B5EF4-FFF2-40B4-BE49-F238E27FC236}">
-                <a16:creationId xmlns:a16="http://schemas.microsoft.com/office/drawing/2014/main" id="{6FC180B1-8ADE-02E5-E3A3-0535805AF461}"/>
-              </a:ext>
-            </a:extLst>
-          </p:cNvPr>
-          <p:cNvSpPr>
-            <a:spLocks noGrp="1"/>
-          </p:cNvSpPr>
-          <p:nvPr>
-            <p:ph idx="1"/>
-          </p:nvPr>
-        </p:nvSpPr>
-        <p:spPr/>
-        <p:txBody>
-          <a:bodyPr/>
-          <a:lstStyle/>
-          <a:p>
-            <a:r>
-              <a:rPr lang="en-US" dirty="0"/>
-              <a:t>Slides 7-10 are in development as I work on testing the feasibility of building and running model problems using the design schematic shown </a:t>
-            </a:r>
-            <a:r>
-              <a:rPr lang="en-US"/>
-              <a:t>in slide 5</a:t>
-            </a:r>
-          </a:p>
-        </p:txBody>
-      </p:sp>
-    </p:spTree>
-    <p:extLst>
-      <p:ext uri="{BB962C8B-B14F-4D97-AF65-F5344CB8AC3E}">
-        <p14:creationId xmlns:p14="http://schemas.microsoft.com/office/powerpoint/2010/main" val="435508651"/>
-      </p:ext>
-    </p:extLst>
-  </p:cSld>
-  <p:clrMapOvr>
-    <a:masterClrMapping/>
-  </p:clrMapOvr>
-</p:sld>
-</file>
-
-<file path=ppt/slides/slide8.xml><?xml version="1.0" encoding="utf-8"?>
-<p:sld xmlns:a="http://schemas.openxmlformats.org/drawingml/2006/main" xmlns:r="http://schemas.openxmlformats.org/officeDocument/2006/relationships" xmlns:p="http://schemas.openxmlformats.org/presentationml/2006/main">
-  <p:cSld>
-    <p:spTree>
-      <p:nvGrpSpPr>
-        <p:cNvPr id="1" name=""/>
-        <p:cNvGrpSpPr/>
-        <p:nvPr/>
-      </p:nvGrpSpPr>
-      <p:grpSpPr>
-        <a:xfrm>
-          <a:off x="0" y="0"/>
-          <a:ext cx="0" cy="0"/>
-          <a:chOff x="0" y="0"/>
-          <a:chExt cx="0" cy="0"/>
-        </a:xfrm>
-      </p:grpSpPr>
-      <p:sp>
-        <p:nvSpPr>
-          <p:cNvPr id="2" name="Title 1">
-            <a:extLst>
-              <a:ext uri="{FF2B5EF4-FFF2-40B4-BE49-F238E27FC236}">
-                <a16:creationId xmlns:a16="http://schemas.microsoft.com/office/drawing/2014/main" id="{F2312ADD-10D2-C30D-79FE-DF6003445989}"/>
-              </a:ext>
-            </a:extLst>
-          </p:cNvPr>
-          <p:cNvSpPr>
-            <a:spLocks noGrp="1"/>
-          </p:cNvSpPr>
-          <p:nvPr>
-            <p:ph type="title"/>
-          </p:nvPr>
-        </p:nvSpPr>
-        <p:spPr/>
-        <p:txBody>
-          <a:bodyPr/>
-          <a:lstStyle/>
-          <a:p>
-            <a:r>
-              <a:rPr lang="en-US" dirty="0"/>
-              <a:t>System #2 Design</a:t>
-            </a:r>
-          </a:p>
-        </p:txBody>
-      </p:sp>
-      <p:sp>
-        <p:nvSpPr>
-          <p:cNvPr id="3" name="Content Placeholder 2">
-            <a:extLst>
-              <a:ext uri="{FF2B5EF4-FFF2-40B4-BE49-F238E27FC236}">
-                <a16:creationId xmlns:a16="http://schemas.microsoft.com/office/drawing/2014/main" id="{828018E3-6DB7-B95E-F955-B9A1A66EA74D}"/>
-              </a:ext>
-            </a:extLst>
-          </p:cNvPr>
-          <p:cNvSpPr>
-            <a:spLocks noGrp="1"/>
-          </p:cNvSpPr>
-          <p:nvPr>
-            <p:ph idx="1"/>
-          </p:nvPr>
-        </p:nvSpPr>
-        <p:spPr/>
-        <p:txBody>
-          <a:bodyPr/>
-          <a:lstStyle/>
-          <a:p>
-            <a:endParaRPr lang="en-US"/>
-          </a:p>
-        </p:txBody>
-      </p:sp>
-    </p:spTree>
-    <p:extLst>
-      <p:ext uri="{BB962C8B-B14F-4D97-AF65-F5344CB8AC3E}">
-        <p14:creationId xmlns:p14="http://schemas.microsoft.com/office/powerpoint/2010/main" val="3618534644"/>
       </p:ext>
     </p:extLst>
   </p:cSld>
@@ -7514,10 +8821,10 @@
       </p:grpSpPr>
       <p:sp>
         <p:nvSpPr>
-          <p:cNvPr id="2" name="Title 1">
-            <a:extLst>
-              <a:ext uri="{FF2B5EF4-FFF2-40B4-BE49-F238E27FC236}">
-                <a16:creationId xmlns:a16="http://schemas.microsoft.com/office/drawing/2014/main" id="{18436D24-715D-C2D5-CB44-ECE2E5B426AF}"/>
+          <p:cNvPr id="11" name="Title 10">
+            <a:extLst>
+              <a:ext uri="{FF2B5EF4-FFF2-40B4-BE49-F238E27FC236}">
+                <a16:creationId xmlns:a16="http://schemas.microsoft.com/office/drawing/2014/main" id="{B1748D03-7FB0-516E-DCC3-DBFD7C2DF205}"/>
               </a:ext>
             </a:extLst>
           </p:cNvPr>
@@ -7528,52 +8835,219 @@
             <p:ph type="title"/>
           </p:nvPr>
         </p:nvSpPr>
-        <p:spPr/>
+        <p:spPr>
+          <a:xfrm>
+            <a:off x="838198" y="1"/>
+            <a:ext cx="10515600" cy="733246"/>
+          </a:xfrm>
+        </p:spPr>
         <p:txBody>
           <a:bodyPr/>
           <a:lstStyle/>
           <a:p>
+            <a:pPr algn="ctr"/>
             <a:r>
               <a:rPr lang="en-US" dirty="0"/>
-              <a:t>System #3 Design, </a:t>
-            </a:r>
-            <a:r>
-              <a:rPr lang="en-US" dirty="0" err="1"/>
-              <a:t>etc</a:t>
-            </a:r>
-            <a:endParaRPr lang="en-US" dirty="0"/>
-          </a:p>
-        </p:txBody>
-      </p:sp>
-      <p:sp>
-        <p:nvSpPr>
-          <p:cNvPr id="3" name="Content Placeholder 2">
-            <a:extLst>
-              <a:ext uri="{FF2B5EF4-FFF2-40B4-BE49-F238E27FC236}">
-                <a16:creationId xmlns:a16="http://schemas.microsoft.com/office/drawing/2014/main" id="{F3DC287B-5D27-6396-96BF-2571335D2819}"/>
-              </a:ext>
-            </a:extLst>
-          </p:cNvPr>
-          <p:cNvSpPr>
-            <a:spLocks noGrp="1"/>
-          </p:cNvSpPr>
-          <p:nvPr>
-            <p:ph idx="1"/>
-          </p:nvPr>
-        </p:nvSpPr>
-        <p:spPr/>
-        <p:txBody>
-          <a:bodyPr/>
+              <a:t>Next Steps</a:t>
+            </a:r>
+          </a:p>
+        </p:txBody>
+      </p:sp>
+      <p:pic>
+        <p:nvPicPr>
+          <p:cNvPr id="20" name="Content Placeholder 4" descr="A body of water with blue sky and clouds&#10;&#10;Description automatically generated with low confidence">
+            <a:extLst>
+              <a:ext uri="{FF2B5EF4-FFF2-40B4-BE49-F238E27FC236}">
+                <a16:creationId xmlns:a16="http://schemas.microsoft.com/office/drawing/2014/main" id="{1758AB50-27A2-F679-EA0A-9A6B42A7786A}"/>
+              </a:ext>
+            </a:extLst>
+          </p:cNvPr>
+          <p:cNvPicPr>
+            <a:picLocks noChangeAspect="1"/>
+          </p:cNvPicPr>
+          <p:nvPr/>
+        </p:nvPicPr>
+        <p:blipFill rotWithShape="1">
+          <a:blip r:embed="rId3"/>
+          <a:srcRect l="55000" t="55539"/>
+          <a:stretch/>
+        </p:blipFill>
+        <p:spPr>
+          <a:xfrm>
+            <a:off x="0" y="-36074"/>
+            <a:ext cx="12365152" cy="6858000"/>
+          </a:xfrm>
+          <a:prstGeom prst="rect">
+            <a:avLst/>
+          </a:prstGeom>
+        </p:spPr>
+      </p:pic>
+      <p:sp>
+        <p:nvSpPr>
+          <p:cNvPr id="21" name="TextBox 20">
+            <a:extLst>
+              <a:ext uri="{FF2B5EF4-FFF2-40B4-BE49-F238E27FC236}">
+                <a16:creationId xmlns:a16="http://schemas.microsoft.com/office/drawing/2014/main" id="{97194565-9712-60A5-602B-34E3E5171064}"/>
+              </a:ext>
+            </a:extLst>
+          </p:cNvPr>
+          <p:cNvSpPr txBox="1"/>
+          <p:nvPr/>
+        </p:nvSpPr>
+        <p:spPr>
+          <a:xfrm>
+            <a:off x="1" y="1530132"/>
+            <a:ext cx="12191999" cy="4401205"/>
+          </a:xfrm>
+          <a:prstGeom prst="rect">
+            <a:avLst/>
+          </a:prstGeom>
+          <a:noFill/>
+        </p:spPr>
+        <p:txBody>
+          <a:bodyPr wrap="square">
+            <a:spAutoFit/>
+          </a:bodyPr>
           <a:lstStyle/>
           <a:p>
-            <a:endParaRPr lang="en-US"/>
+            <a:pPr marL="457200" indent="-457200">
+              <a:buFont typeface="Arial" panose="020B0604020202020204" pitchFamily="34" charset="0"/>
+              <a:buChar char="•"/>
+            </a:pPr>
+            <a:r>
+              <a:rPr lang="en-US" sz="2800" dirty="0">
+                <a:solidFill>
+                  <a:schemeClr val="bg1"/>
+                </a:solidFill>
+              </a:rPr>
+              <a:t>Continue to document design requirements for each system in product design</a:t>
+            </a:r>
+          </a:p>
+          <a:p>
+            <a:endParaRPr lang="en-US" sz="2800" dirty="0">
+              <a:solidFill>
+                <a:schemeClr val="bg1"/>
+              </a:solidFill>
+            </a:endParaRPr>
+          </a:p>
+          <a:p>
+            <a:pPr marL="457200" indent="-457200">
+              <a:buFont typeface="Arial" panose="020B0604020202020204" pitchFamily="34" charset="0"/>
+              <a:buChar char="•"/>
+            </a:pPr>
+            <a:r>
+              <a:rPr lang="en-US" sz="2800" dirty="0">
+                <a:solidFill>
+                  <a:schemeClr val="bg1"/>
+                </a:solidFill>
+              </a:rPr>
+              <a:t>Research preliminary designs for Container Technology and Container Orchestration Systems</a:t>
+            </a:r>
+          </a:p>
+          <a:p>
+            <a:endParaRPr lang="en-US" sz="2800" dirty="0">
+              <a:solidFill>
+                <a:schemeClr val="bg1"/>
+              </a:solidFill>
+            </a:endParaRPr>
+          </a:p>
+          <a:p>
+            <a:pPr marL="457200" indent="-457200">
+              <a:buFont typeface="Arial" panose="020B0604020202020204" pitchFamily="34" charset="0"/>
+              <a:buChar char="•"/>
+            </a:pPr>
+            <a:r>
+              <a:rPr lang="en-US" sz="2800" dirty="0">
+                <a:solidFill>
+                  <a:schemeClr val="bg1"/>
+                </a:solidFill>
+              </a:rPr>
+              <a:t>Document strengths/weaknesses of designs and check designs against requirements</a:t>
+            </a:r>
+          </a:p>
+          <a:p>
+            <a:endParaRPr lang="en-US" sz="2800" dirty="0">
+              <a:solidFill>
+                <a:schemeClr val="bg1"/>
+              </a:solidFill>
+            </a:endParaRPr>
+          </a:p>
+          <a:p>
+            <a:pPr marL="457200" indent="-457200">
+              <a:buFont typeface="Arial" panose="020B0604020202020204" pitchFamily="34" charset="0"/>
+              <a:buChar char="•"/>
+            </a:pPr>
+            <a:r>
+              <a:rPr lang="en-US" sz="2800" dirty="0">
+                <a:solidFill>
+                  <a:schemeClr val="bg1"/>
+                </a:solidFill>
+              </a:rPr>
+              <a:t>Design and implement Feasibility Analysis Tool to </a:t>
+            </a:r>
+            <a:r>
+              <a:rPr lang="en-US" sz="2800" dirty="0" err="1">
+                <a:solidFill>
+                  <a:schemeClr val="bg1"/>
+                </a:solidFill>
+              </a:rPr>
+              <a:t>downselect</a:t>
+            </a:r>
+            <a:r>
+              <a:rPr lang="en-US" sz="2800" dirty="0">
+                <a:solidFill>
+                  <a:schemeClr val="bg1"/>
+                </a:solidFill>
+              </a:rPr>
+              <a:t> designs that are optimal according to requirement definitions and project objectives</a:t>
+            </a:r>
+          </a:p>
+        </p:txBody>
+      </p:sp>
+      <p:sp>
+        <p:nvSpPr>
+          <p:cNvPr id="22" name="TextBox 21">
+            <a:extLst>
+              <a:ext uri="{FF2B5EF4-FFF2-40B4-BE49-F238E27FC236}">
+                <a16:creationId xmlns:a16="http://schemas.microsoft.com/office/drawing/2014/main" id="{D393A796-A6DC-7BA0-42EB-E38FAD3D81B0}"/>
+              </a:ext>
+            </a:extLst>
+          </p:cNvPr>
+          <p:cNvSpPr txBox="1"/>
+          <p:nvPr/>
+        </p:nvSpPr>
+        <p:spPr>
+          <a:xfrm>
+            <a:off x="4536138" y="57509"/>
+            <a:ext cx="3119717" cy="769441"/>
+          </a:xfrm>
+          <a:prstGeom prst="rect">
+            <a:avLst/>
+          </a:prstGeom>
+          <a:noFill/>
+        </p:spPr>
+        <p:txBody>
+          <a:bodyPr wrap="square" rtlCol="0">
+            <a:spAutoFit/>
+          </a:bodyPr>
+          <a:lstStyle/>
+          <a:p>
+            <a:pPr algn="ctr"/>
+            <a:r>
+              <a:rPr lang="en-US" sz="4400" dirty="0">
+                <a:solidFill>
+                  <a:schemeClr val="bg1"/>
+                </a:solidFill>
+              </a:rPr>
+              <a:t>Next Steps</a:t>
+            </a:r>
           </a:p>
         </p:txBody>
       </p:sp>
     </p:spTree>
     <p:extLst>
       <p:ext uri="{BB962C8B-B14F-4D97-AF65-F5344CB8AC3E}">
-        <p14:creationId xmlns:p14="http://schemas.microsoft.com/office/powerpoint/2010/main" val="3500577399"/>
+        <p14:creationId xmlns:p14="http://schemas.microsoft.com/office/powerpoint/2010/main" val="988854764"/>
       </p:ext>
     </p:extLst>
   </p:cSld>

</xml_diff>